<commit_message>
add DrawCirlce Code, yet not success
</commit_message>
<xml_diff>
--- a/0122Canvas_Design/Canvas_Design.pptx
+++ b/0122Canvas_Design/Canvas_Design.pptx
@@ -290,7 +290,7 @@
             <a:fld id="{5E3A7089-CF8E-484A-920D-7C62B5BD452A}" type="datetimeFigureOut">
               <a:rPr lang="ko-KR" altLang="en-US" smtClean="0"/>
               <a:pPr/>
-              <a:t>2019-01-22</a:t>
+              <a:t>2019-01-23</a:t>
             </a:fld>
             <a:endParaRPr lang="ko-KR" altLang="en-US"/>
           </a:p>
@@ -457,7 +457,7 @@
             <a:fld id="{5E3A7089-CF8E-484A-920D-7C62B5BD452A}" type="datetimeFigureOut">
               <a:rPr lang="ko-KR" altLang="en-US" smtClean="0"/>
               <a:pPr/>
-              <a:t>2019-01-22</a:t>
+              <a:t>2019-01-23</a:t>
             </a:fld>
             <a:endParaRPr lang="ko-KR" altLang="en-US"/>
           </a:p>
@@ -634,7 +634,7 @@
             <a:fld id="{5E3A7089-CF8E-484A-920D-7C62B5BD452A}" type="datetimeFigureOut">
               <a:rPr lang="ko-KR" altLang="en-US" smtClean="0"/>
               <a:pPr/>
-              <a:t>2019-01-22</a:t>
+              <a:t>2019-01-23</a:t>
             </a:fld>
             <a:endParaRPr lang="ko-KR" altLang="en-US"/>
           </a:p>
@@ -801,7 +801,7 @@
             <a:fld id="{5E3A7089-CF8E-484A-920D-7C62B5BD452A}" type="datetimeFigureOut">
               <a:rPr lang="ko-KR" altLang="en-US" smtClean="0"/>
               <a:pPr/>
-              <a:t>2019-01-22</a:t>
+              <a:t>2019-01-23</a:t>
             </a:fld>
             <a:endParaRPr lang="ko-KR" altLang="en-US"/>
           </a:p>
@@ -1044,7 +1044,7 @@
             <a:fld id="{5E3A7089-CF8E-484A-920D-7C62B5BD452A}" type="datetimeFigureOut">
               <a:rPr lang="ko-KR" altLang="en-US" smtClean="0"/>
               <a:pPr/>
-              <a:t>2019-01-22</a:t>
+              <a:t>2019-01-23</a:t>
             </a:fld>
             <a:endParaRPr lang="ko-KR" altLang="en-US"/>
           </a:p>
@@ -1329,7 +1329,7 @@
             <a:fld id="{5E3A7089-CF8E-484A-920D-7C62B5BD452A}" type="datetimeFigureOut">
               <a:rPr lang="ko-KR" altLang="en-US" smtClean="0"/>
               <a:pPr/>
-              <a:t>2019-01-22</a:t>
+              <a:t>2019-01-23</a:t>
             </a:fld>
             <a:endParaRPr lang="ko-KR" altLang="en-US"/>
           </a:p>
@@ -1748,7 +1748,7 @@
             <a:fld id="{5E3A7089-CF8E-484A-920D-7C62B5BD452A}" type="datetimeFigureOut">
               <a:rPr lang="ko-KR" altLang="en-US" smtClean="0"/>
               <a:pPr/>
-              <a:t>2019-01-22</a:t>
+              <a:t>2019-01-23</a:t>
             </a:fld>
             <a:endParaRPr lang="ko-KR" altLang="en-US"/>
           </a:p>
@@ -1863,7 +1863,7 @@
             <a:fld id="{5E3A7089-CF8E-484A-920D-7C62B5BD452A}" type="datetimeFigureOut">
               <a:rPr lang="ko-KR" altLang="en-US" smtClean="0"/>
               <a:pPr/>
-              <a:t>2019-01-22</a:t>
+              <a:t>2019-01-23</a:t>
             </a:fld>
             <a:endParaRPr lang="ko-KR" altLang="en-US"/>
           </a:p>
@@ -1955,7 +1955,7 @@
             <a:fld id="{5E3A7089-CF8E-484A-920D-7C62B5BD452A}" type="datetimeFigureOut">
               <a:rPr lang="ko-KR" altLang="en-US" smtClean="0"/>
               <a:pPr/>
-              <a:t>2019-01-22</a:t>
+              <a:t>2019-01-23</a:t>
             </a:fld>
             <a:endParaRPr lang="ko-KR" altLang="en-US"/>
           </a:p>
@@ -2229,7 +2229,7 @@
             <a:fld id="{5E3A7089-CF8E-484A-920D-7C62B5BD452A}" type="datetimeFigureOut">
               <a:rPr lang="ko-KR" altLang="en-US" smtClean="0"/>
               <a:pPr/>
-              <a:t>2019-01-22</a:t>
+              <a:t>2019-01-23</a:t>
             </a:fld>
             <a:endParaRPr lang="ko-KR" altLang="en-US"/>
           </a:p>
@@ -2479,7 +2479,7 @@
             <a:fld id="{5E3A7089-CF8E-484A-920D-7C62B5BD452A}" type="datetimeFigureOut">
               <a:rPr lang="ko-KR" altLang="en-US" smtClean="0"/>
               <a:pPr/>
-              <a:t>2019-01-22</a:t>
+              <a:t>2019-01-23</a:t>
             </a:fld>
             <a:endParaRPr lang="ko-KR" altLang="en-US"/>
           </a:p>
@@ -2689,7 +2689,7 @@
             <a:fld id="{5E3A7089-CF8E-484A-920D-7C62B5BD452A}" type="datetimeFigureOut">
               <a:rPr lang="ko-KR" altLang="en-US" smtClean="0"/>
               <a:pPr/>
-              <a:t>2019-01-22</a:t>
+              <a:t>2019-01-23</a:t>
             </a:fld>
             <a:endParaRPr lang="ko-KR" altLang="en-US"/>
           </a:p>
@@ -3068,8 +3068,8 @@
         </p:nvSpPr>
         <p:spPr>
           <a:xfrm>
-            <a:off x="11881320" y="0"/>
-            <a:ext cx="2376364" cy="738664"/>
+            <a:off x="11593288" y="44624"/>
+            <a:ext cx="2232348" cy="738664"/>
           </a:xfrm>
           <a:prstGeom prst="rect">
             <a:avLst/>
@@ -3100,38 +3100,25 @@
             </a:r>
             <a:r>
               <a:rPr lang="en-US" altLang="ko-KR" sz="1200" dirty="0" smtClean="0"/>
-              <a:t> </a:t>
-            </a:r>
+              <a:t> : array of </a:t>
+            </a:r>
+            <a:r>
+              <a:rPr lang="en-US" altLang="ko-KR" sz="1200" dirty="0" err="1" smtClean="0"/>
+              <a:t>CircleData</a:t>
+            </a:r>
+            <a:endParaRPr lang="en-US" altLang="ko-KR" sz="1200" dirty="0" smtClean="0"/>
+          </a:p>
+          <a:p>
             <a:r>
               <a:rPr lang="en-US" altLang="ko-KR" sz="1200" dirty="0" smtClean="0"/>
-              <a:t>: </a:t>
-            </a:r>
+              <a:t>Size, Interval  Integer</a:t>
+            </a:r>
+          </a:p>
+          <a:p>
             <a:r>
               <a:rPr lang="en-US" altLang="ko-KR" sz="1200" dirty="0" smtClean="0"/>
-              <a:t>array of </a:t>
-            </a:r>
-            <a:r>
-              <a:rPr lang="en-US" altLang="ko-KR" sz="1200" dirty="0" err="1" smtClean="0"/>
-              <a:t>CirCleData</a:t>
-            </a:r>
-            <a:endParaRPr lang="en-US" altLang="ko-KR" sz="1200" dirty="0" smtClean="0"/>
-          </a:p>
-          <a:p>
-            <a:r>
-              <a:rPr lang="en-US" altLang="ko-KR" sz="1200" dirty="0" smtClean="0"/>
-              <a:t>Size, Interval </a:t>
-            </a:r>
-            <a:r>
-              <a:rPr lang="en-US" altLang="ko-KR" sz="1200" dirty="0" smtClean="0"/>
-              <a:t> Integer</a:t>
-            </a:r>
-          </a:p>
-          <a:p>
-            <a:r>
-              <a:rPr lang="en-US" altLang="ko-KR" sz="1200" dirty="0" smtClean="0"/>
-              <a:t>Color : Color</a:t>
-            </a:r>
-            <a:endParaRPr lang="en-US" altLang="ko-KR" sz="1200" dirty="0" smtClean="0"/>
+              <a:t>Color : Integer</a:t>
+            </a:r>
           </a:p>
         </p:txBody>
       </p:sp>
@@ -3143,15 +3130,15 @@
         </p:nvSpPr>
         <p:spPr>
           <a:xfrm>
-            <a:off x="9865196" y="0"/>
-            <a:ext cx="2016224" cy="738664"/>
+            <a:off x="11593388" y="908720"/>
+            <a:ext cx="2664296" cy="161583"/>
           </a:xfrm>
           <a:prstGeom prst="rect">
             <a:avLst/>
           </a:prstGeom>
         </p:spPr>
         <p:txBody>
-          <a:bodyPr wrap="square">
+          <a:bodyPr wrap="square" lIns="0" tIns="0" rIns="0" bIns="0">
             <a:spAutoFit/>
           </a:bodyPr>
           <a:lstStyle/>
@@ -3162,11 +3149,8 @@
             </a:r>
             <a:r>
               <a:rPr lang="en-US" altLang="ko-KR" sz="1050" dirty="0" smtClean="0"/>
-              <a:t> =(</a:t>
-            </a:r>
-            <a:endParaRPr lang="en-US" altLang="ko-KR" sz="1050" dirty="0" smtClean="0"/>
-          </a:p>
-          <a:p>
+              <a:t> = (</a:t>
+            </a:r>
             <a:r>
               <a:rPr lang="en-US" altLang="ko-KR" sz="1050" dirty="0" err="1" smtClean="0"/>
               <a:t>iX</a:t>
@@ -3189,24 +3173,15 @@
             </a:r>
             <a:r>
               <a:rPr lang="en-US" altLang="ko-KR" sz="1050" dirty="0" smtClean="0"/>
-              <a:t>, = Integer</a:t>
-            </a:r>
-          </a:p>
-          <a:p>
+              <a:t>, </a:t>
+            </a:r>
             <a:r>
               <a:rPr lang="en-US" altLang="ko-KR" sz="1050" dirty="0" err="1" smtClean="0"/>
               <a:t>iColor</a:t>
             </a:r>
             <a:r>
               <a:rPr lang="en-US" altLang="ko-KR" sz="1050" dirty="0" smtClean="0"/>
-              <a:t> = Color</a:t>
-            </a:r>
-            <a:endParaRPr lang="en-US" altLang="ko-KR" sz="1050" dirty="0" smtClean="0"/>
-          </a:p>
-          <a:p>
-            <a:r>
-              <a:rPr lang="en-US" altLang="ko-KR" sz="1050" dirty="0" smtClean="0"/>
-              <a:t>)</a:t>
+              <a:t> = Integer)</a:t>
             </a:r>
             <a:endParaRPr lang="ko-KR" altLang="en-US" sz="1050" dirty="0"/>
           </a:p>
@@ -3220,10 +3195,10 @@
         </p:nvGrpSpPr>
         <p:grpSpPr>
           <a:xfrm>
-            <a:off x="360140" y="836712"/>
-            <a:ext cx="4032448" cy="5013175"/>
-            <a:chOff x="4926749" y="1484782"/>
-            <a:chExt cx="2185953" cy="1470257"/>
+            <a:off x="144112" y="188640"/>
+            <a:ext cx="5112569" cy="5976665"/>
+            <a:chOff x="4926746" y="1573086"/>
+            <a:chExt cx="2570645" cy="1752828"/>
           </a:xfrm>
         </p:grpSpPr>
         <p:sp>
@@ -3234,8 +3209,8 @@
           </p:nvSpPr>
           <p:spPr>
             <a:xfrm rot="10800000" flipV="1">
-              <a:off x="4926749" y="1484784"/>
-              <a:ext cx="2185952" cy="1470255"/>
+              <a:off x="4926746" y="1573086"/>
+              <a:ext cx="2570645" cy="1752828"/>
             </a:xfrm>
             <a:prstGeom prst="rect">
               <a:avLst/>
@@ -3279,8 +3254,8 @@
           </p:nvSpPr>
           <p:spPr>
             <a:xfrm rot="10800000" flipV="1">
-              <a:off x="4926752" y="1484782"/>
-              <a:ext cx="2185950" cy="187991"/>
+              <a:off x="4926751" y="1573086"/>
+              <a:ext cx="2570640" cy="99687"/>
             </a:xfrm>
             <a:prstGeom prst="rect">
               <a:avLst/>
@@ -3354,23 +3329,7 @@
                     <a:schemeClr val="tx1"/>
                   </a:solidFill>
                 </a:rPr>
-                <a:t> =</a:t>
-              </a:r>
-              <a:r>
-                <a:rPr lang="en-US" altLang="ko-KR" sz="1200" dirty="0" smtClean="0">
-                  <a:solidFill>
-                    <a:schemeClr val="tx1"/>
-                  </a:solidFill>
-                </a:rPr>
-                <a:t> </a:t>
-              </a:r>
-              <a:r>
-                <a:rPr lang="en-US" altLang="ko-KR" sz="1200" dirty="0" smtClean="0">
-                  <a:solidFill>
-                    <a:schemeClr val="tx1"/>
-                  </a:solidFill>
-                </a:rPr>
-                <a:t>Integer)</a:t>
+                <a:t> = Integer)</a:t>
               </a:r>
               <a:endParaRPr lang="ko-KR" altLang="en-US" sz="1200" dirty="0">
                 <a:solidFill>
@@ -3389,7 +3348,7 @@
         </p:nvSpPr>
         <p:spPr>
           <a:xfrm>
-            <a:off x="432148" y="1529408"/>
+            <a:off x="288132" y="580242"/>
             <a:ext cx="1080120" cy="276999"/>
           </a:xfrm>
           <a:prstGeom prst="rect">
@@ -3408,11 +3367,7 @@
             </a:r>
             <a:r>
               <a:rPr lang="en-US" altLang="ko-KR" sz="900" dirty="0" smtClean="0"/>
-              <a:t> </a:t>
-            </a:r>
-            <a:r>
-              <a:rPr lang="en-US" altLang="ko-KR" sz="900" dirty="0" smtClean="0"/>
-              <a:t>: </a:t>
+              <a:t> : </a:t>
             </a:r>
             <a:r>
               <a:rPr lang="en-US" altLang="ko-KR" sz="900" dirty="0" err="1" smtClean="0"/>
@@ -3427,9 +3382,16 @@
             </a:r>
             <a:r>
               <a:rPr lang="en-US" altLang="ko-KR" sz="900" dirty="0" smtClean="0"/>
-              <a:t> : Integer</a:t>
-            </a:r>
-            <a:endParaRPr lang="en-US" altLang="ko-KR" sz="900" dirty="0" smtClean="0"/>
+              <a:t> , </a:t>
+            </a:r>
+            <a:r>
+              <a:rPr lang="en-US" altLang="ko-KR" sz="900" dirty="0" err="1" smtClean="0"/>
+              <a:t>i</a:t>
+            </a:r>
+            <a:r>
+              <a:rPr lang="en-US" altLang="ko-KR" sz="900" dirty="0" smtClean="0"/>
+              <a:t>: Integer</a:t>
+            </a:r>
           </a:p>
         </p:txBody>
       </p:sp>
@@ -3441,7 +3403,7 @@
         </p:nvSpPr>
         <p:spPr>
           <a:xfrm>
-            <a:off x="1440260" y="1745432"/>
+            <a:off x="1584276" y="535618"/>
             <a:ext cx="1843773" cy="245517"/>
           </a:xfrm>
           <a:prstGeom prst="flowChartTerminator">
@@ -3494,10 +3456,10 @@
         </p:nvGrpSpPr>
         <p:grpSpPr>
           <a:xfrm>
-            <a:off x="9577164" y="764704"/>
-            <a:ext cx="4608514" cy="5544616"/>
-            <a:chOff x="4926749" y="998835"/>
-            <a:chExt cx="2185954" cy="2124305"/>
+            <a:off x="10153225" y="1628801"/>
+            <a:ext cx="3744420" cy="3672406"/>
+            <a:chOff x="4926748" y="998835"/>
+            <a:chExt cx="2185955" cy="1428339"/>
           </a:xfrm>
         </p:grpSpPr>
         <p:sp>
@@ -3508,8 +3470,8 @@
           </p:nvSpPr>
           <p:spPr>
             <a:xfrm rot="10800000" flipV="1">
-              <a:off x="4926749" y="998835"/>
-              <a:ext cx="2185952" cy="2124305"/>
+              <a:off x="4926748" y="998835"/>
+              <a:ext cx="2185952" cy="1428339"/>
             </a:xfrm>
             <a:prstGeom prst="rect">
               <a:avLst/>
@@ -3554,7 +3516,7 @@
           <p:spPr>
             <a:xfrm rot="10800000" flipV="1">
               <a:off x="4926753" y="998835"/>
-              <a:ext cx="2185950" cy="193119"/>
+              <a:ext cx="2185950" cy="126447"/>
             </a:xfrm>
             <a:prstGeom prst="rect">
               <a:avLst/>
@@ -3625,46 +3587,13 @@
       </p:grpSp>
       <p:sp>
         <p:nvSpPr>
-          <p:cNvPr id="71" name="직사각형 70"/>
-          <p:cNvSpPr/>
-          <p:nvPr/>
-        </p:nvSpPr>
-        <p:spPr>
-          <a:xfrm>
-            <a:off x="10855789" y="1555448"/>
-            <a:ext cx="227755" cy="246221"/>
-          </a:xfrm>
-          <a:prstGeom prst="rect">
-            <a:avLst/>
-          </a:prstGeom>
-        </p:spPr>
-        <p:txBody>
-          <a:bodyPr wrap="none">
-            <a:spAutoFit/>
-          </a:bodyPr>
-          <a:lstStyle/>
-          <a:p>
-            <a:r>
-              <a:rPr lang="en-US" altLang="ko-KR" sz="1000" dirty="0" smtClean="0">
-                <a:solidFill>
-                  <a:prstClr val="black"/>
-                </a:solidFill>
-              </a:rPr>
-              <a:t>,</a:t>
-            </a:r>
-            <a:endParaRPr lang="ko-KR" altLang="en-US" dirty="0"/>
-          </a:p>
-        </p:txBody>
-      </p:sp>
-      <p:sp>
-        <p:nvSpPr>
           <p:cNvPr id="15" name="직사각형 14"/>
           <p:cNvSpPr/>
           <p:nvPr/>
         </p:nvSpPr>
         <p:spPr>
           <a:xfrm rot="10800000" flipV="1">
-            <a:off x="10576253" y="2784377"/>
+            <a:off x="10761947" y="2978089"/>
             <a:ext cx="2560897" cy="306895"/>
           </a:xfrm>
           <a:prstGeom prst="rect">
@@ -3694,12 +3623,36 @@
           <a:p>
             <a:pPr algn="ctr"/>
             <a:r>
+              <a:rPr lang="en-US" altLang="ko-KR" sz="1000" dirty="0" err="1" smtClean="0">
+                <a:solidFill>
+                  <a:schemeClr val="tx1"/>
+                </a:solidFill>
+              </a:rPr>
+              <a:t>CirCleArray</a:t>
+            </a:r>
+            <a:r>
               <a:rPr lang="en-US" altLang="ko-KR" sz="1000" dirty="0" smtClean="0">
                 <a:solidFill>
                   <a:schemeClr val="tx1"/>
                 </a:solidFill>
               </a:rPr>
-              <a:t>)</a:t>
+              <a:t>[</a:t>
+            </a:r>
+            <a:r>
+              <a:rPr lang="en-US" altLang="ko-KR" sz="1000" dirty="0" err="1" smtClean="0">
+                <a:solidFill>
+                  <a:schemeClr val="tx1"/>
+                </a:solidFill>
+              </a:rPr>
+              <a:t>aIndex</a:t>
+            </a:r>
+            <a:r>
+              <a:rPr lang="en-US" altLang="ko-KR" sz="1000" dirty="0" smtClean="0">
+                <a:solidFill>
+                  <a:schemeClr val="tx1"/>
+                </a:solidFill>
+              </a:rPr>
+              <a:t>] = null</a:t>
             </a:r>
             <a:endParaRPr lang="ko-KR" altLang="en-US" sz="1000" dirty="0">
               <a:solidFill>
@@ -3711,109 +3664,13 @@
       </p:sp>
       <p:sp>
         <p:nvSpPr>
-          <p:cNvPr id="17" name="TextBox 16"/>
-          <p:cNvSpPr txBox="1"/>
-          <p:nvPr/>
-        </p:nvSpPr>
-        <p:spPr>
-          <a:xfrm>
-            <a:off x="11382521" y="2411016"/>
-            <a:ext cx="268474" cy="153888"/>
-          </a:xfrm>
-          <a:prstGeom prst="rect">
-            <a:avLst/>
-          </a:prstGeom>
-          <a:noFill/>
-        </p:spPr>
-        <p:txBody>
-          <a:bodyPr wrap="square" lIns="0" tIns="0" rIns="0" bIns="0" rtlCol="0">
-            <a:spAutoFit/>
-          </a:bodyPr>
-          <a:lstStyle/>
-          <a:p>
-            <a:r>
-              <a:rPr lang="en-US" altLang="ko-KR" sz="1000" dirty="0" smtClean="0"/>
-              <a:t>Yes</a:t>
-            </a:r>
-            <a:endParaRPr lang="ko-KR" altLang="en-US" sz="1000" dirty="0"/>
-          </a:p>
-        </p:txBody>
-      </p:sp>
-      <p:sp>
-        <p:nvSpPr>
-          <p:cNvPr id="18" name="TextBox 17"/>
-          <p:cNvSpPr txBox="1"/>
-          <p:nvPr/>
-        </p:nvSpPr>
-        <p:spPr>
-          <a:xfrm>
-            <a:off x="12983714" y="2001683"/>
-            <a:ext cx="203451" cy="131173"/>
-          </a:xfrm>
-          <a:prstGeom prst="rect">
-            <a:avLst/>
-          </a:prstGeom>
-          <a:noFill/>
-        </p:spPr>
-        <p:txBody>
-          <a:bodyPr wrap="square" lIns="0" tIns="0" rIns="0" bIns="0" rtlCol="0">
-            <a:spAutoFit/>
-          </a:bodyPr>
-          <a:lstStyle/>
-          <a:p>
-            <a:r>
-              <a:rPr lang="en-US" altLang="ko-KR" sz="1000" dirty="0" smtClean="0"/>
-              <a:t>No</a:t>
-            </a:r>
-            <a:endParaRPr lang="ko-KR" altLang="en-US" sz="1000" dirty="0"/>
-          </a:p>
-        </p:txBody>
-      </p:sp>
-      <p:cxnSp>
-        <p:nvCxnSpPr>
-          <p:cNvPr id="19" name="직선 화살표 연결선 18"/>
-          <p:cNvCxnSpPr>
-            <a:stCxn id="24" idx="2"/>
-            <a:endCxn id="15" idx="0"/>
-          </p:cNvCxnSpPr>
-          <p:nvPr/>
-        </p:nvCxnSpPr>
-        <p:spPr>
-          <a:xfrm>
-            <a:off x="11838999" y="2433910"/>
-            <a:ext cx="17702" cy="350467"/>
-          </a:xfrm>
-          <a:prstGeom prst="straightConnector1">
-            <a:avLst/>
-          </a:prstGeom>
-          <a:ln>
-            <a:tailEnd type="arrow"/>
-          </a:ln>
-        </p:spPr>
-        <p:style>
-          <a:lnRef idx="1">
-            <a:schemeClr val="accent1"/>
-          </a:lnRef>
-          <a:fillRef idx="0">
-            <a:schemeClr val="accent1"/>
-          </a:fillRef>
-          <a:effectRef idx="0">
-            <a:schemeClr val="accent1"/>
-          </a:effectRef>
-          <a:fontRef idx="minor">
-            <a:schemeClr val="tx1"/>
-          </a:fontRef>
-        </p:style>
-      </p:cxnSp>
-      <p:sp>
-        <p:nvSpPr>
           <p:cNvPr id="20" name="순서도: 수행의 시작/종료 19"/>
           <p:cNvSpPr/>
           <p:nvPr/>
         </p:nvSpPr>
         <p:spPr>
           <a:xfrm>
-            <a:off x="10873356" y="3221825"/>
+            <a:off x="11089332" y="4653136"/>
             <a:ext cx="1966691" cy="245517"/>
           </a:xfrm>
           <a:prstGeom prst="flowChartTerminator">
@@ -3866,7 +3723,7 @@
         </p:nvSpPr>
         <p:spPr>
           <a:xfrm>
-            <a:off x="10864744" y="1556792"/>
+            <a:off x="11040152" y="2103363"/>
             <a:ext cx="1966691" cy="245517"/>
           </a:xfrm>
           <a:prstGeom prst="flowChartTerminator">
@@ -3911,89 +3768,18 @@
           </a:p>
         </p:txBody>
       </p:sp>
-      <p:cxnSp>
-        <p:nvCxnSpPr>
-          <p:cNvPr id="22" name="직선 화살표 연결선 21"/>
-          <p:cNvCxnSpPr>
-            <a:stCxn id="21" idx="2"/>
-          </p:cNvCxnSpPr>
-          <p:nvPr/>
-        </p:nvCxnSpPr>
-        <p:spPr>
-          <a:xfrm>
-            <a:off x="11848089" y="1802309"/>
-            <a:ext cx="5065" cy="256616"/>
-          </a:xfrm>
-          <a:prstGeom prst="straightConnector1">
-            <a:avLst/>
-          </a:prstGeom>
-          <a:ln>
-            <a:tailEnd type="arrow"/>
-          </a:ln>
-        </p:spPr>
-        <p:style>
-          <a:lnRef idx="1">
-            <a:schemeClr val="accent1"/>
-          </a:lnRef>
-          <a:fillRef idx="0">
-            <a:schemeClr val="accent1"/>
-          </a:fillRef>
-          <a:effectRef idx="0">
-            <a:schemeClr val="accent1"/>
-          </a:effectRef>
-          <a:fontRef idx="minor">
-            <a:schemeClr val="tx1"/>
-          </a:fontRef>
-        </p:style>
-      </p:cxnSp>
-      <p:cxnSp>
-        <p:nvCxnSpPr>
-          <p:cNvPr id="23" name="직선 화살표 연결선 22"/>
-          <p:cNvCxnSpPr>
-            <a:stCxn id="15" idx="2"/>
-            <a:endCxn id="20" idx="0"/>
-          </p:cNvCxnSpPr>
-          <p:nvPr/>
-        </p:nvCxnSpPr>
-        <p:spPr>
-          <a:xfrm>
-            <a:off x="11856701" y="3091272"/>
-            <a:ext cx="0" cy="130553"/>
-          </a:xfrm>
-          <a:prstGeom prst="straightConnector1">
-            <a:avLst/>
-          </a:prstGeom>
-          <a:ln>
-            <a:tailEnd type="arrow"/>
-          </a:ln>
-        </p:spPr>
-        <p:style>
-          <a:lnRef idx="1">
-            <a:schemeClr val="accent1"/>
-          </a:lnRef>
-          <a:fillRef idx="0">
-            <a:schemeClr val="accent1"/>
-          </a:fillRef>
-          <a:effectRef idx="0">
-            <a:schemeClr val="accent1"/>
-          </a:effectRef>
-          <a:fontRef idx="minor">
-            <a:schemeClr val="tx1"/>
-          </a:fontRef>
-        </p:style>
-      </p:cxnSp>
-      <p:sp>
-        <p:nvSpPr>
-          <p:cNvPr id="24" name="순서도: 판단 23"/>
+      <p:sp>
+        <p:nvSpPr>
+          <p:cNvPr id="159" name="순서도: 수행의 시작/종료 158"/>
           <p:cNvSpPr/>
           <p:nvPr/>
         </p:nvSpPr>
         <p:spPr>
           <a:xfrm>
-            <a:off x="10490832" y="2060848"/>
-            <a:ext cx="2696333" cy="373062"/>
-          </a:xfrm>
-          <a:prstGeom prst="flowChartDecision">
+            <a:off x="6685033" y="735212"/>
+            <a:ext cx="1966691" cy="245517"/>
+          </a:xfrm>
+          <a:prstGeom prst="flowChartTerminator">
             <a:avLst/>
           </a:prstGeom>
           <a:noFill/>
@@ -4015,7 +3801,7 @@
           </a:fontRef>
         </p:style>
         <p:txBody>
-          <a:bodyPr lIns="0" tIns="9578" rIns="0" bIns="9578" rtlCol="0" anchor="ctr"/>
+          <a:bodyPr lIns="0" tIns="0" rIns="0" bIns="0" rtlCol="0" anchor="ctr"/>
           <a:lstStyle/>
           <a:p>
             <a:pPr algn="ctr"/>
@@ -4025,23 +3811,7 @@
                   <a:schemeClr val="tx1"/>
                 </a:solidFill>
               </a:rPr>
-              <a:t>i &lt; length(</a:t>
-            </a:r>
-            <a:r>
-              <a:rPr lang="en-US" altLang="ko-KR" sz="1000" dirty="0" err="1" smtClean="0">
-                <a:solidFill>
-                  <a:schemeClr val="tx1"/>
-                </a:solidFill>
-              </a:rPr>
-              <a:t>CircleArray</a:t>
-            </a:r>
-            <a:r>
-              <a:rPr lang="en-US" altLang="ko-KR" sz="1000" dirty="0" smtClean="0">
-                <a:solidFill>
-                  <a:schemeClr val="tx1"/>
-                </a:solidFill>
-              </a:rPr>
-              <a:t>)</a:t>
+              <a:t>START</a:t>
             </a:r>
             <a:endParaRPr lang="ko-KR" altLang="en-US" sz="1000" dirty="0">
               <a:solidFill>
@@ -4053,16 +3823,16 @@
       </p:sp>
       <p:sp>
         <p:nvSpPr>
-          <p:cNvPr id="177" name="직사각형 176"/>
+          <p:cNvPr id="29" name="순서도: 수행의 시작/종료 28"/>
           <p:cNvSpPr/>
           <p:nvPr/>
         </p:nvSpPr>
         <p:spPr>
-          <a:xfrm rot="10800000" flipV="1">
-            <a:off x="9937203" y="3789040"/>
-            <a:ext cx="3888432" cy="2016224"/>
-          </a:xfrm>
-          <a:prstGeom prst="rect">
+          <a:xfrm>
+            <a:off x="1400224" y="5661248"/>
+            <a:ext cx="2366662" cy="288032"/>
+          </a:xfrm>
+          <a:prstGeom prst="flowChartTerminator">
             <a:avLst/>
           </a:prstGeom>
           <a:noFill/>
@@ -4088,6 +3858,14 @@
           <a:lstStyle/>
           <a:p>
             <a:pPr algn="ctr"/>
+            <a:r>
+              <a:rPr lang="en-US" altLang="ko-KR" sz="1000" dirty="0" smtClean="0">
+                <a:solidFill>
+                  <a:schemeClr val="tx1"/>
+                </a:solidFill>
+              </a:rPr>
+              <a:t>END</a:t>
+            </a:r>
             <a:endParaRPr lang="ko-KR" altLang="en-US" sz="1000" dirty="0">
               <a:solidFill>
                 <a:schemeClr val="tx1"/>
@@ -4098,16 +3876,16 @@
       </p:sp>
       <p:sp>
         <p:nvSpPr>
-          <p:cNvPr id="159" name="순서도: 수행의 시작/종료 158"/>
+          <p:cNvPr id="32" name="직사각형 31"/>
           <p:cNvSpPr/>
           <p:nvPr/>
         </p:nvSpPr>
         <p:spPr>
-          <a:xfrm>
-            <a:off x="5696683" y="1628799"/>
-            <a:ext cx="1966691" cy="245517"/>
-          </a:xfrm>
-          <a:prstGeom prst="flowChartTerminator">
+          <a:xfrm rot="10800000" flipV="1">
+            <a:off x="305550" y="3112770"/>
+            <a:ext cx="2664296" cy="545316"/>
+          </a:xfrm>
+          <a:prstGeom prst="rect">
             <a:avLst/>
           </a:prstGeom>
           <a:noFill/>
@@ -4134,118 +3912,79 @@
           <a:p>
             <a:pPr algn="ctr"/>
             <a:r>
+              <a:rPr lang="en-US" altLang="ko-KR" sz="1000" dirty="0" err="1" smtClean="0">
+                <a:solidFill>
+                  <a:schemeClr val="tx1"/>
+                </a:solidFill>
+              </a:rPr>
+              <a:t>SetLength</a:t>
+            </a:r>
+            <a:r>
               <a:rPr lang="en-US" altLang="ko-KR" sz="1000" dirty="0" smtClean="0">
                 <a:solidFill>
                   <a:schemeClr val="tx1"/>
                 </a:solidFill>
               </a:rPr>
-              <a:t>START</a:t>
-            </a:r>
-            <a:endParaRPr lang="ko-KR" altLang="en-US" sz="1000" dirty="0">
-              <a:solidFill>
-                <a:schemeClr val="tx1"/>
-              </a:solidFill>
-            </a:endParaRPr>
-          </a:p>
-        </p:txBody>
-      </p:sp>
-      <p:sp>
-        <p:nvSpPr>
-          <p:cNvPr id="29" name="순서도: 수행의 시작/종료 28"/>
-          <p:cNvSpPr/>
-          <p:nvPr/>
-        </p:nvSpPr>
-        <p:spPr>
-          <a:xfrm>
-            <a:off x="1175805" y="5417840"/>
-            <a:ext cx="2366662" cy="288032"/>
-          </a:xfrm>
-          <a:prstGeom prst="flowChartTerminator">
-            <a:avLst/>
-          </a:prstGeom>
-          <a:noFill/>
-        </p:spPr>
-        <p:style>
-          <a:lnRef idx="2">
-            <a:schemeClr val="accent1">
-              <a:shade val="50000"/>
-            </a:schemeClr>
-          </a:lnRef>
-          <a:fillRef idx="1">
-            <a:schemeClr val="accent1"/>
-          </a:fillRef>
-          <a:effectRef idx="0">
-            <a:schemeClr val="accent1"/>
-          </a:effectRef>
-          <a:fontRef idx="minor">
-            <a:schemeClr val="lt1"/>
-          </a:fontRef>
-        </p:style>
-        <p:txBody>
-          <a:bodyPr lIns="0" tIns="0" rIns="0" bIns="0" rtlCol="0" anchor="ctr"/>
-          <a:lstStyle/>
+              <a:t>(</a:t>
+            </a:r>
+            <a:r>
+              <a:rPr lang="en-US" altLang="ko-KR" sz="1000" dirty="0" err="1" smtClean="0">
+                <a:solidFill>
+                  <a:schemeClr val="tx1"/>
+                </a:solidFill>
+              </a:rPr>
+              <a:t>CircleArray,Length</a:t>
+            </a:r>
+            <a:r>
+              <a:rPr lang="en-US" altLang="ko-KR" sz="1000" dirty="0" smtClean="0">
+                <a:solidFill>
+                  <a:schemeClr val="tx1"/>
+                </a:solidFill>
+              </a:rPr>
+              <a:t>(</a:t>
+            </a:r>
+            <a:r>
+              <a:rPr lang="en-US" altLang="ko-KR" sz="1000" dirty="0" err="1" smtClean="0">
+                <a:solidFill>
+                  <a:schemeClr val="tx1"/>
+                </a:solidFill>
+              </a:rPr>
+              <a:t>CircleArray</a:t>
+            </a:r>
+            <a:r>
+              <a:rPr lang="en-US" altLang="ko-KR" sz="1000" dirty="0" smtClean="0">
+                <a:solidFill>
+                  <a:schemeClr val="tx1"/>
+                </a:solidFill>
+              </a:rPr>
+              <a:t> +1)</a:t>
+            </a:r>
+          </a:p>
           <a:p>
             <a:pPr algn="ctr"/>
             <a:r>
+              <a:rPr lang="en-US" altLang="ko-KR" sz="1000" dirty="0" err="1" smtClean="0">
+                <a:solidFill>
+                  <a:schemeClr val="tx1"/>
+                </a:solidFill>
+              </a:rPr>
+              <a:t>aIndex</a:t>
+            </a:r>
+            <a:r>
               <a:rPr lang="en-US" altLang="ko-KR" sz="1000" dirty="0" smtClean="0">
                 <a:solidFill>
                   <a:schemeClr val="tx1"/>
                 </a:solidFill>
               </a:rPr>
-              <a:t>END</a:t>
-            </a:r>
-            <a:endParaRPr lang="ko-KR" altLang="en-US" sz="1000" dirty="0">
-              <a:solidFill>
-                <a:schemeClr val="tx1"/>
-              </a:solidFill>
-            </a:endParaRPr>
-          </a:p>
-        </p:txBody>
-      </p:sp>
-      <p:sp>
-        <p:nvSpPr>
-          <p:cNvPr id="32" name="직사각형 31"/>
-          <p:cNvSpPr/>
-          <p:nvPr/>
-        </p:nvSpPr>
-        <p:spPr>
-          <a:xfrm rot="10800000" flipV="1">
-            <a:off x="583935" y="3329608"/>
-            <a:ext cx="3568776" cy="648072"/>
-          </a:xfrm>
-          <a:prstGeom prst="rect">
-            <a:avLst/>
-          </a:prstGeom>
-          <a:noFill/>
-        </p:spPr>
-        <p:style>
-          <a:lnRef idx="2">
-            <a:schemeClr val="accent1">
-              <a:shade val="50000"/>
-            </a:schemeClr>
-          </a:lnRef>
-          <a:fillRef idx="1">
-            <a:schemeClr val="accent1"/>
-          </a:fillRef>
-          <a:effectRef idx="0">
-            <a:schemeClr val="accent1"/>
-          </a:effectRef>
-          <a:fontRef idx="minor">
-            <a:schemeClr val="lt1"/>
-          </a:fontRef>
-        </p:style>
-        <p:txBody>
-          <a:bodyPr lIns="0" tIns="0" rIns="0" bIns="0" rtlCol="0" anchor="ctr"/>
-          <a:lstStyle/>
-          <a:p>
-            <a:pPr algn="ctr"/>
+              <a:t> = Length(</a:t>
+            </a:r>
             <a:r>
               <a:rPr lang="en-US" altLang="ko-KR" sz="1000" dirty="0" err="1" smtClean="0">
                 <a:solidFill>
                   <a:schemeClr val="tx1"/>
                 </a:solidFill>
               </a:rPr>
-              <a:t>SetLength</a:t>
+              <a:t>CircleArray</a:t>
             </a:r>
             <a:r>
               <a:rPr lang="en-US" altLang="ko-KR" sz="1000" dirty="0" smtClean="0">
@@ -4253,178 +3992,11 @@
                   <a:schemeClr val="tx1"/>
                 </a:solidFill>
               </a:rPr>
-              <a:t>(</a:t>
-            </a:r>
-            <a:r>
-              <a:rPr lang="en-US" altLang="ko-KR" sz="1000" dirty="0" err="1" smtClean="0">
-                <a:solidFill>
-                  <a:schemeClr val="tx1"/>
-                </a:solidFill>
-              </a:rPr>
-              <a:t>CircleArray</a:t>
-            </a:r>
-            <a:r>
-              <a:rPr lang="en-US" altLang="ko-KR" sz="1000" dirty="0" smtClean="0">
-                <a:solidFill>
-                  <a:schemeClr val="tx1"/>
-                </a:solidFill>
-              </a:rPr>
-              <a:t>, Length(</a:t>
-            </a:r>
-            <a:r>
-              <a:rPr lang="en-US" altLang="ko-KR" sz="1000" dirty="0" err="1" smtClean="0">
-                <a:solidFill>
-                  <a:schemeClr val="tx1"/>
-                </a:solidFill>
-              </a:rPr>
-              <a:t>CircleArray</a:t>
-            </a:r>
-            <a:r>
-              <a:rPr lang="en-US" altLang="ko-KR" sz="1000" dirty="0" smtClean="0">
-                <a:solidFill>
-                  <a:schemeClr val="tx1"/>
-                </a:solidFill>
-              </a:rPr>
-              <a:t>) +</a:t>
-            </a:r>
-            <a:r>
-              <a:rPr lang="en-US" altLang="ko-KR" sz="1000" dirty="0" smtClean="0">
-                <a:solidFill>
-                  <a:schemeClr val="tx1"/>
-                </a:solidFill>
-              </a:rPr>
-              <a:t>1</a:t>
-            </a:r>
-            <a:r>
-              <a:rPr lang="en-US" altLang="ko-KR" sz="1000" dirty="0" smtClean="0">
-                <a:solidFill>
-                  <a:schemeClr val="tx1"/>
-                </a:solidFill>
-              </a:rPr>
-              <a:t>)</a:t>
-            </a:r>
-          </a:p>
-          <a:p>
-            <a:pPr algn="ctr"/>
-            <a:r>
-              <a:rPr lang="en-US" altLang="ko-KR" sz="1000" dirty="0" err="1" smtClean="0">
-                <a:solidFill>
-                  <a:schemeClr val="tx1"/>
-                </a:solidFill>
-              </a:rPr>
-              <a:t>aIndex</a:t>
-            </a:r>
-            <a:r>
-              <a:rPr lang="en-US" altLang="ko-KR" sz="1000" dirty="0" smtClean="0">
-                <a:solidFill>
-                  <a:schemeClr val="tx1"/>
-                </a:solidFill>
-              </a:rPr>
-              <a:t> = Length(</a:t>
-            </a:r>
-            <a:r>
-              <a:rPr lang="en-US" altLang="ko-KR" sz="1000" dirty="0" err="1" smtClean="0">
-                <a:solidFill>
-                  <a:schemeClr val="tx1"/>
-                </a:solidFill>
-              </a:rPr>
-              <a:t>CircleArray</a:t>
-            </a:r>
-            <a:r>
-              <a:rPr lang="en-US" altLang="ko-KR" sz="1000" dirty="0" smtClean="0">
-                <a:solidFill>
-                  <a:schemeClr val="tx1"/>
-                </a:solidFill>
-              </a:rPr>
               <a:t>) - 1</a:t>
             </a:r>
           </a:p>
-          <a:p>
-            <a:pPr algn="ctr"/>
-            <a:r>
-              <a:rPr lang="en-US" altLang="ko-KR" sz="1000" dirty="0" err="1" smtClean="0">
-                <a:solidFill>
-                  <a:schemeClr val="tx1"/>
-                </a:solidFill>
-              </a:rPr>
-              <a:t>CircleArray</a:t>
-            </a:r>
-            <a:r>
-              <a:rPr lang="en-US" altLang="ko-KR" sz="1000" dirty="0" smtClean="0">
-                <a:solidFill>
-                  <a:schemeClr val="tx1"/>
-                </a:solidFill>
-              </a:rPr>
-              <a:t>[</a:t>
-            </a:r>
-            <a:r>
-              <a:rPr lang="en-US" altLang="ko-KR" sz="1000" dirty="0" err="1" smtClean="0">
-                <a:solidFill>
-                  <a:schemeClr val="tx1"/>
-                </a:solidFill>
-              </a:rPr>
-              <a:t>aIndex</a:t>
-            </a:r>
-            <a:r>
-              <a:rPr lang="en-US" altLang="ko-KR" sz="1000" dirty="0" smtClean="0">
-                <a:solidFill>
-                  <a:schemeClr val="tx1"/>
-                </a:solidFill>
-              </a:rPr>
-              <a:t>] = </a:t>
-            </a:r>
-            <a:r>
-              <a:rPr lang="en-US" altLang="ko-KR" sz="1000" dirty="0" err="1" smtClean="0">
-                <a:solidFill>
-                  <a:schemeClr val="tx1"/>
-                </a:solidFill>
-              </a:rPr>
-              <a:t>aRecord</a:t>
-            </a:r>
-            <a:endParaRPr lang="ko-KR" altLang="en-US" sz="1000" dirty="0" smtClean="0">
-              <a:solidFill>
-                <a:schemeClr val="tx1"/>
-              </a:solidFill>
-            </a:endParaRPr>
-          </a:p>
-        </p:txBody>
-      </p:sp>
-      <p:cxnSp>
-        <p:nvCxnSpPr>
-          <p:cNvPr id="34" name="직선 화살표 연결선 33"/>
-          <p:cNvCxnSpPr>
-            <a:stCxn id="14" idx="2"/>
-            <a:endCxn id="47" idx="0"/>
-          </p:cNvCxnSpPr>
-          <p:nvPr/>
-        </p:nvCxnSpPr>
-        <p:spPr>
-          <a:xfrm>
-            <a:off x="2362147" y="1990949"/>
-            <a:ext cx="6176" cy="258538"/>
-          </a:xfrm>
-          <a:prstGeom prst="straightConnector1">
-            <a:avLst/>
-          </a:prstGeom>
-          <a:ln>
-            <a:tailEnd type="arrow"/>
-          </a:ln>
-        </p:spPr>
-        <p:style>
-          <a:lnRef idx="1">
-            <a:schemeClr val="accent1"/>
-          </a:lnRef>
-          <a:fillRef idx="0">
-            <a:schemeClr val="accent1"/>
-          </a:fillRef>
-          <a:effectRef idx="0">
-            <a:schemeClr val="accent1"/>
-          </a:effectRef>
-          <a:fontRef idx="minor">
-            <a:schemeClr val="tx1"/>
-          </a:fontRef>
-        </p:style>
-      </p:cxnSp>
+        </p:txBody>
+      </p:sp>
       <p:sp>
         <p:nvSpPr>
           <p:cNvPr id="47" name="직사각형 46"/>
@@ -4433,8 +4005,8 @@
         </p:nvSpPr>
         <p:spPr>
           <a:xfrm rot="10800000" flipV="1">
-            <a:off x="583935" y="2249487"/>
-            <a:ext cx="3568776" cy="864096"/>
+            <a:off x="811238" y="3874765"/>
+            <a:ext cx="3568776" cy="576065"/>
           </a:xfrm>
           <a:prstGeom prst="rect">
             <a:avLst/>
@@ -4577,8 +4149,8 @@
         </p:nvGrpSpPr>
         <p:grpSpPr>
           <a:xfrm>
-            <a:off x="4536604" y="1268758"/>
-            <a:ext cx="4320480" cy="1872209"/>
+            <a:off x="5387300" y="260648"/>
+            <a:ext cx="4621912" cy="3312368"/>
             <a:chOff x="9865196" y="908719"/>
             <a:chExt cx="4320480" cy="1152129"/>
           </a:xfrm>
@@ -4637,7 +4209,7 @@
           <p:spPr>
             <a:xfrm rot="10800000" flipV="1">
               <a:off x="9865202" y="908720"/>
-              <a:ext cx="4320474" cy="177250"/>
+              <a:ext cx="4320474" cy="125230"/>
             </a:xfrm>
             <a:prstGeom prst="rect">
               <a:avLst/>
@@ -4671,7 +4243,7 @@
                     <a:schemeClr val="tx1"/>
                   </a:solidFill>
                 </a:rPr>
-                <a:t>DrowCircle</a:t>
+                <a:t>DrawCircle</a:t>
               </a:r>
               <a:r>
                 <a:rPr lang="en-US" altLang="ko-KR" sz="1200" dirty="0" smtClean="0">
@@ -4706,42 +4278,6 @@
           </p:txBody>
         </p:sp>
       </p:grpSp>
-      <p:cxnSp>
-        <p:nvCxnSpPr>
-          <p:cNvPr id="64" name="직선 화살표 연결선 63"/>
-          <p:cNvCxnSpPr>
-            <a:stCxn id="47" idx="2"/>
-            <a:endCxn id="32" idx="0"/>
-          </p:cNvCxnSpPr>
-          <p:nvPr/>
-        </p:nvCxnSpPr>
-        <p:spPr>
-          <a:xfrm>
-            <a:off x="2368323" y="3113583"/>
-            <a:ext cx="0" cy="216025"/>
-          </a:xfrm>
-          <a:prstGeom prst="straightConnector1">
-            <a:avLst/>
-          </a:prstGeom>
-          <a:ln>
-            <a:tailEnd type="arrow"/>
-          </a:ln>
-        </p:spPr>
-        <p:style>
-          <a:lnRef idx="1">
-            <a:schemeClr val="accent1"/>
-          </a:lnRef>
-          <a:fillRef idx="0">
-            <a:schemeClr val="accent1"/>
-          </a:fillRef>
-          <a:effectRef idx="0">
-            <a:schemeClr val="accent1"/>
-          </a:effectRef>
-          <a:fontRef idx="minor">
-            <a:schemeClr val="tx1"/>
-          </a:fontRef>
-        </p:style>
-      </p:cxnSp>
       <p:sp>
         <p:nvSpPr>
           <p:cNvPr id="70" name="직사각형 69"/>
@@ -4750,8 +4286,8 @@
         </p:nvSpPr>
         <p:spPr>
           <a:xfrm rot="10800000" flipV="1">
-            <a:off x="575984" y="4233459"/>
-            <a:ext cx="3568776" cy="432048"/>
+            <a:off x="810750" y="5229200"/>
+            <a:ext cx="3568776" cy="306052"/>
           </a:xfrm>
           <a:prstGeom prst="rect">
             <a:avLst/>
@@ -4819,11 +4355,6 @@
               </a:rPr>
               <a:t>)</a:t>
             </a:r>
-            <a:endParaRPr lang="en-US" altLang="ko-KR" sz="1000" dirty="0" smtClean="0">
-              <a:solidFill>
-                <a:schemeClr val="tx1"/>
-              </a:solidFill>
-            </a:endParaRPr>
           </a:p>
           <a:p>
             <a:pPr algn="ctr"/>
@@ -4849,63 +4380,11 @@
                   <a:schemeClr val="tx1"/>
                 </a:solidFill>
               </a:rPr>
-              <a:t> </a:t>
-            </a:r>
-            <a:r>
-              <a:rPr lang="en-US" altLang="ko-KR" sz="1000" dirty="0" smtClean="0">
-                <a:solidFill>
-                  <a:schemeClr val="tx1"/>
-                </a:solidFill>
-              </a:rPr>
-              <a:t>= Interval * </a:t>
-            </a:r>
-            <a:r>
-              <a:rPr lang="en-US" altLang="ko-KR" sz="1000" dirty="0" smtClean="0">
-                <a:solidFill>
-                  <a:schemeClr val="tx1"/>
-                </a:solidFill>
-              </a:rPr>
-              <a:t>1000)</a:t>
-            </a:r>
-          </a:p>
-        </p:txBody>
-      </p:sp>
-      <p:cxnSp>
-        <p:nvCxnSpPr>
-          <p:cNvPr id="74" name="직선 화살표 연결선 73"/>
-          <p:cNvCxnSpPr>
-            <a:stCxn id="70" idx="2"/>
-            <a:endCxn id="119" idx="0"/>
-          </p:cNvCxnSpPr>
-          <p:nvPr/>
-        </p:nvCxnSpPr>
-        <p:spPr>
-          <a:xfrm>
-            <a:off x="2360372" y="4665507"/>
-            <a:ext cx="0" cy="248277"/>
-          </a:xfrm>
-          <a:prstGeom prst="straightConnector1">
-            <a:avLst/>
-          </a:prstGeom>
-          <a:ln>
-            <a:tailEnd type="arrow"/>
-          </a:ln>
-        </p:spPr>
-        <p:style>
-          <a:lnRef idx="1">
-            <a:schemeClr val="accent1"/>
-          </a:lnRef>
-          <a:fillRef idx="0">
-            <a:schemeClr val="accent1"/>
-          </a:fillRef>
-          <a:effectRef idx="0">
-            <a:schemeClr val="accent1"/>
-          </a:effectRef>
-          <a:fontRef idx="minor">
-            <a:schemeClr val="tx1"/>
-          </a:fontRef>
-        </p:style>
-      </p:cxnSp>
+              <a:t> = Interval * 1000)</a:t>
+            </a:r>
+          </a:p>
+        </p:txBody>
+      </p:sp>
       <p:grpSp>
         <p:nvGrpSpPr>
           <p:cNvPr id="84" name="그룹 20"/>
@@ -4914,8 +4393,8 @@
         </p:nvGrpSpPr>
         <p:grpSpPr>
           <a:xfrm>
-            <a:off x="4536604" y="3212976"/>
-            <a:ext cx="4320482" cy="1872208"/>
+            <a:off x="5400698" y="4005064"/>
+            <a:ext cx="4608514" cy="1872208"/>
             <a:chOff x="4926749" y="1026423"/>
             <a:chExt cx="2185954" cy="632911"/>
           </a:xfrm>
@@ -5051,7 +4530,7 @@
         </p:nvSpPr>
         <p:spPr>
           <a:xfrm rot="10800000" flipV="1">
-            <a:off x="4896644" y="4005064"/>
+            <a:off x="5891692" y="4797152"/>
             <a:ext cx="3568776" cy="234318"/>
           </a:xfrm>
           <a:prstGeom prst="rect">
@@ -5128,7 +4607,7 @@
         </p:nvSpPr>
         <p:spPr>
           <a:xfrm>
-            <a:off x="5757371" y="4725144"/>
+            <a:off x="6752419" y="5517232"/>
             <a:ext cx="1843773" cy="245517"/>
           </a:xfrm>
           <a:prstGeom prst="flowChartTerminator">
@@ -5184,7 +4663,7 @@
         </p:nvCxnSpPr>
         <p:spPr>
           <a:xfrm flipH="1">
-            <a:off x="6679258" y="4599422"/>
+            <a:off x="7674306" y="5391510"/>
             <a:ext cx="1774" cy="125722"/>
           </a:xfrm>
           <a:prstGeom prst="straightConnector1">
@@ -5211,162 +4690,13 @@
       </p:cxnSp>
       <p:sp>
         <p:nvSpPr>
-          <p:cNvPr id="119" name="직사각형 118"/>
-          <p:cNvSpPr/>
-          <p:nvPr/>
-        </p:nvSpPr>
-        <p:spPr>
-          <a:xfrm rot="10800000" flipV="1">
-            <a:off x="575984" y="4913784"/>
-            <a:ext cx="3568776" cy="288031"/>
-          </a:xfrm>
-          <a:prstGeom prst="rect">
-            <a:avLst/>
-          </a:prstGeom>
-          <a:noFill/>
-        </p:spPr>
-        <p:style>
-          <a:lnRef idx="2">
-            <a:schemeClr val="accent1">
-              <a:shade val="50000"/>
-            </a:schemeClr>
-          </a:lnRef>
-          <a:fillRef idx="1">
-            <a:schemeClr val="accent1"/>
-          </a:fillRef>
-          <a:effectRef idx="0">
-            <a:schemeClr val="accent1"/>
-          </a:effectRef>
-          <a:fontRef idx="minor">
-            <a:schemeClr val="lt1"/>
-          </a:fontRef>
-        </p:style>
-        <p:txBody>
-          <a:bodyPr lIns="0" tIns="0" rIns="0" bIns="0" rtlCol="0" anchor="ctr"/>
-          <a:lstStyle/>
-          <a:p>
-            <a:pPr algn="ctr"/>
-            <a:r>
-              <a:rPr lang="en-US" altLang="ko-KR" sz="1000" dirty="0" err="1" smtClean="0">
-                <a:solidFill>
-                  <a:schemeClr val="tx1"/>
-                </a:solidFill>
-              </a:rPr>
-              <a:t>DrawCircle</a:t>
-            </a:r>
-            <a:r>
-              <a:rPr lang="en-US" altLang="ko-KR" sz="1000" dirty="0" smtClean="0">
-                <a:solidFill>
-                  <a:schemeClr val="tx1"/>
-                </a:solidFill>
-              </a:rPr>
-              <a:t>(</a:t>
-            </a:r>
-            <a:r>
-              <a:rPr lang="en-US" altLang="ko-KR" sz="1000" dirty="0" err="1" smtClean="0">
-                <a:solidFill>
-                  <a:schemeClr val="tx1"/>
-                </a:solidFill>
-              </a:rPr>
-              <a:t>aIndex</a:t>
-            </a:r>
-            <a:r>
-              <a:rPr lang="en-US" altLang="ko-KR" sz="1000" dirty="0" smtClean="0">
-                <a:solidFill>
-                  <a:schemeClr val="tx1"/>
-                </a:solidFill>
-              </a:rPr>
-              <a:t>)</a:t>
-            </a:r>
-            <a:endParaRPr lang="ko-KR" altLang="en-US" sz="1000" dirty="0" smtClean="0">
-              <a:solidFill>
-                <a:schemeClr val="tx1"/>
-              </a:solidFill>
-            </a:endParaRPr>
-          </a:p>
-        </p:txBody>
-      </p:sp>
-      <p:cxnSp>
-        <p:nvCxnSpPr>
-          <p:cNvPr id="122" name="직선 화살표 연결선 121"/>
-          <p:cNvCxnSpPr>
-            <a:stCxn id="119" idx="2"/>
-            <a:endCxn id="29" idx="0"/>
-          </p:cNvCxnSpPr>
-          <p:nvPr/>
-        </p:nvCxnSpPr>
-        <p:spPr>
-          <a:xfrm flipH="1">
-            <a:off x="2359136" y="5201815"/>
-            <a:ext cx="1236" cy="216025"/>
-          </a:xfrm>
-          <a:prstGeom prst="straightConnector1">
-            <a:avLst/>
-          </a:prstGeom>
-          <a:ln>
-            <a:tailEnd type="arrow"/>
-          </a:ln>
-        </p:spPr>
-        <p:style>
-          <a:lnRef idx="1">
-            <a:schemeClr val="accent1"/>
-          </a:lnRef>
-          <a:fillRef idx="0">
-            <a:schemeClr val="accent1"/>
-          </a:fillRef>
-          <a:effectRef idx="0">
-            <a:schemeClr val="accent1"/>
-          </a:effectRef>
-          <a:fontRef idx="minor">
-            <a:schemeClr val="tx1"/>
-          </a:fontRef>
-        </p:style>
-      </p:cxnSp>
-      <p:cxnSp>
-        <p:nvCxnSpPr>
-          <p:cNvPr id="127" name="직선 화살표 연결선 126"/>
-          <p:cNvCxnSpPr>
-            <a:stCxn id="32" idx="2"/>
-            <a:endCxn id="70" idx="0"/>
-          </p:cNvCxnSpPr>
-          <p:nvPr/>
-        </p:nvCxnSpPr>
-        <p:spPr>
-          <a:xfrm flipH="1">
-            <a:off x="2360372" y="3977680"/>
-            <a:ext cx="7951" cy="255779"/>
-          </a:xfrm>
-          <a:prstGeom prst="straightConnector1">
-            <a:avLst/>
-          </a:prstGeom>
-          <a:ln>
-            <a:tailEnd type="arrow"/>
-          </a:ln>
-        </p:spPr>
-        <p:style>
-          <a:lnRef idx="1">
-            <a:schemeClr val="accent1"/>
-          </a:lnRef>
-          <a:fillRef idx="0">
-            <a:schemeClr val="accent1"/>
-          </a:fillRef>
-          <a:effectRef idx="0">
-            <a:schemeClr val="accent1"/>
-          </a:effectRef>
-          <a:fontRef idx="minor">
-            <a:schemeClr val="tx1"/>
-          </a:fontRef>
-        </p:style>
-      </p:cxnSp>
-      <p:sp>
-        <p:nvSpPr>
           <p:cNvPr id="151" name="직사각형 150"/>
           <p:cNvSpPr/>
           <p:nvPr/>
         </p:nvSpPr>
         <p:spPr>
           <a:xfrm rot="10800000" flipV="1">
-            <a:off x="4896644" y="4365104"/>
+            <a:off x="5891692" y="5157192"/>
             <a:ext cx="3568776" cy="234318"/>
           </a:xfrm>
           <a:prstGeom prst="rect">
@@ -5422,7 +4752,7 @@
         </p:nvCxnSpPr>
         <p:spPr>
           <a:xfrm>
-            <a:off x="6681032" y="4239382"/>
+            <a:off x="7676080" y="5031470"/>
             <a:ext cx="0" cy="125722"/>
           </a:xfrm>
           <a:prstGeom prst="straightConnector1">
@@ -5455,8 +4785,8 @@
         </p:nvSpPr>
         <p:spPr>
           <a:xfrm rot="10800000" flipV="1">
-            <a:off x="4896644" y="2132856"/>
-            <a:ext cx="3568776" cy="432048"/>
+            <a:off x="5884994" y="1095252"/>
+            <a:ext cx="3568776" cy="605556"/>
           </a:xfrm>
           <a:prstGeom prst="rect">
             <a:avLst/>
@@ -5498,7 +4828,7 @@
                   <a:schemeClr val="tx1"/>
                 </a:solidFill>
               </a:rPr>
-              <a:t>Pen.Color</a:t>
+              <a:t>aX</a:t>
             </a:r>
             <a:r>
               <a:rPr lang="en-US" altLang="ko-KR" sz="1000" dirty="0" smtClean="0">
@@ -5506,7 +4836,47 @@
                   <a:schemeClr val="tx1"/>
                 </a:solidFill>
               </a:rPr>
-              <a:t> = Color</a:t>
+              <a:t> = </a:t>
+            </a:r>
+            <a:r>
+              <a:rPr lang="en-US" altLang="ko-KR" sz="1000" dirty="0" err="1" smtClean="0">
+                <a:solidFill>
+                  <a:schemeClr val="tx1"/>
+                </a:solidFill>
+              </a:rPr>
+              <a:t>CircleArray</a:t>
+            </a:r>
+            <a:r>
+              <a:rPr lang="en-US" altLang="ko-KR" sz="1000" dirty="0" smtClean="0">
+                <a:solidFill>
+                  <a:schemeClr val="tx1"/>
+                </a:solidFill>
+              </a:rPr>
+              <a:t>[</a:t>
+            </a:r>
+            <a:r>
+              <a:rPr lang="en-US" altLang="ko-KR" sz="1000" dirty="0" err="1" smtClean="0">
+                <a:solidFill>
+                  <a:schemeClr val="tx1"/>
+                </a:solidFill>
+              </a:rPr>
+              <a:t>aIndex</a:t>
+            </a:r>
+            <a:r>
+              <a:rPr lang="en-US" altLang="ko-KR" sz="1000" dirty="0" smtClean="0">
+                <a:solidFill>
+                  <a:schemeClr val="tx1"/>
+                </a:solidFill>
+              </a:rPr>
+              <a:t>].</a:t>
+            </a:r>
+            <a:r>
+              <a:rPr lang="en-US" altLang="ko-KR" sz="1000" dirty="0" err="1" smtClean="0">
+                <a:solidFill>
+                  <a:schemeClr val="tx1"/>
+                </a:solidFill>
+              </a:rPr>
+              <a:t>iX</a:t>
             </a:r>
             <a:endParaRPr lang="en-US" altLang="ko-KR" sz="1000" dirty="0" smtClean="0">
               <a:solidFill>
@@ -5517,12 +4887,28 @@
           <a:p>
             <a:pPr algn="ctr"/>
             <a:r>
+              <a:rPr lang="en-US" altLang="ko-KR" sz="1000" dirty="0" err="1" smtClean="0">
+                <a:solidFill>
+                  <a:schemeClr val="tx1"/>
+                </a:solidFill>
+              </a:rPr>
+              <a:t>aY</a:t>
+            </a:r>
+            <a:r>
               <a:rPr lang="en-US" altLang="ko-KR" sz="1000" dirty="0" smtClean="0">
                 <a:solidFill>
                   <a:schemeClr val="tx1"/>
                 </a:solidFill>
               </a:rPr>
-              <a:t>Ellipse</a:t>
+              <a:t> = </a:t>
+            </a:r>
+            <a:r>
+              <a:rPr lang="en-US" altLang="ko-KR" sz="1000" dirty="0" err="1" smtClean="0">
+                <a:solidFill>
+                  <a:schemeClr val="tx1"/>
+                </a:solidFill>
+              </a:rPr>
+              <a:t>CircleArray</a:t>
             </a:r>
             <a:r>
               <a:rPr lang="en-US" altLang="ko-KR" sz="1000" dirty="0" smtClean="0">
@@ -5530,7 +4916,15 @@
                   <a:schemeClr val="tx1"/>
                 </a:solidFill>
               </a:rPr>
-              <a:t>((</a:t>
+              <a:t>[</a:t>
+            </a:r>
+            <a:r>
+              <a:rPr lang="en-US" altLang="ko-KR" sz="1000" dirty="0" err="1" smtClean="0">
+                <a:solidFill>
+                  <a:schemeClr val="tx1"/>
+                </a:solidFill>
+              </a:rPr>
+              <a:t>aIndex</a:t>
             </a:r>
             <a:r>
               <a:rPr lang="en-US" altLang="ko-KR" sz="1000" dirty="0" smtClean="0">
@@ -5538,7 +4932,7 @@
                   <a:schemeClr val="tx1"/>
                 </a:solidFill>
               </a:rPr>
-              <a:t>X-Size, Y-Size, </a:t>
+              <a:t>].</a:t>
             </a:r>
             <a:r>
               <a:rPr lang="en-US" altLang="ko-KR" sz="1000" dirty="0" err="1" smtClean="0">
@@ -5546,32 +4940,13 @@
                   <a:schemeClr val="tx1"/>
                 </a:solidFill>
               </a:rPr>
-              <a:t>X+Size</a:t>
-            </a:r>
-            <a:r>
-              <a:rPr lang="en-US" altLang="ko-KR" sz="1000" dirty="0" smtClean="0">
-                <a:solidFill>
-                  <a:schemeClr val="tx1"/>
-                </a:solidFill>
-              </a:rPr>
-              <a:t>, </a:t>
-            </a:r>
-            <a:r>
-              <a:rPr lang="en-US" altLang="ko-KR" sz="1000" dirty="0" err="1" smtClean="0">
-                <a:solidFill>
-                  <a:schemeClr val="tx1"/>
-                </a:solidFill>
-              </a:rPr>
-              <a:t>Y+Size</a:t>
-            </a:r>
-            <a:r>
-              <a:rPr lang="en-US" altLang="ko-KR" sz="1000" dirty="0" smtClean="0">
-                <a:solidFill>
-                  <a:schemeClr val="tx1"/>
-                </a:solidFill>
-              </a:rPr>
-              <a:t>) </a:t>
-            </a:r>
+              <a:t>yX</a:t>
+            </a:r>
+            <a:endParaRPr lang="en-US" altLang="ko-KR" sz="1000" dirty="0" smtClean="0">
+              <a:solidFill>
+                <a:schemeClr val="tx1"/>
+              </a:solidFill>
+            </a:endParaRPr>
           </a:p>
           <a:p>
             <a:pPr algn="ctr"/>
@@ -5594,8 +4969,8 @@
         </p:nvCxnSpPr>
         <p:spPr>
           <a:xfrm>
-            <a:off x="6680029" y="1874316"/>
-            <a:ext cx="1003" cy="258540"/>
+            <a:off x="7668379" y="980729"/>
+            <a:ext cx="1003" cy="114523"/>
           </a:xfrm>
           <a:prstGeom prst="straightConnector1">
             <a:avLst/>
@@ -5627,7 +5002,7 @@
         </p:nvSpPr>
         <p:spPr>
           <a:xfrm>
-            <a:off x="5696683" y="2780927"/>
+            <a:off x="6698095" y="3183483"/>
             <a:ext cx="1966691" cy="245517"/>
           </a:xfrm>
           <a:prstGeom prst="flowChartTerminator">
@@ -5676,15 +5051,15 @@
         <p:nvCxnSpPr>
           <p:cNvPr id="167" name="직선 화살표 연결선 166"/>
           <p:cNvCxnSpPr>
-            <a:stCxn id="158" idx="2"/>
+            <a:stCxn id="313" idx="2"/>
             <a:endCxn id="165" idx="0"/>
           </p:cNvCxnSpPr>
           <p:nvPr/>
         </p:nvCxnSpPr>
         <p:spPr>
           <a:xfrm flipH="1">
-            <a:off x="6680029" y="2564904"/>
-            <a:ext cx="1003" cy="216023"/>
+            <a:off x="7681441" y="3089364"/>
+            <a:ext cx="1172" cy="94119"/>
           </a:xfrm>
           <a:prstGeom prst="straightConnector1">
             <a:avLst/>
@@ -5716,7 +5091,7 @@
         </p:nvSpPr>
         <p:spPr>
           <a:xfrm>
-            <a:off x="5757371" y="3645023"/>
+            <a:off x="6752419" y="4437111"/>
             <a:ext cx="1843773" cy="245517"/>
           </a:xfrm>
           <a:prstGeom prst="flowChartTerminator">
@@ -5772,7 +5147,7 @@
         </p:nvCxnSpPr>
         <p:spPr>
           <a:xfrm>
-            <a:off x="6679258" y="3890540"/>
+            <a:off x="7674306" y="4682628"/>
             <a:ext cx="1774" cy="114524"/>
           </a:xfrm>
           <a:prstGeom prst="straightConnector1">
@@ -5799,14 +5174,14 @@
       </p:cxnSp>
       <p:sp>
         <p:nvSpPr>
-          <p:cNvPr id="178" name="직사각형 177"/>
+          <p:cNvPr id="94" name="직사각형 93"/>
           <p:cNvSpPr/>
           <p:nvPr/>
         </p:nvSpPr>
         <p:spPr>
           <a:xfrm rot="10800000" flipV="1">
-            <a:off x="9937204" y="3789041"/>
-            <a:ext cx="3888432" cy="360039"/>
+            <a:off x="988249" y="836712"/>
+            <a:ext cx="3024338" cy="1512168"/>
           </a:xfrm>
           <a:prstGeom prst="rect">
             <a:avLst/>
@@ -5842,6 +5217,2084 @@
           </a:p>
         </p:txBody>
       </p:sp>
+      <p:sp>
+        <p:nvSpPr>
+          <p:cNvPr id="96" name="직사각형 95"/>
+          <p:cNvSpPr/>
+          <p:nvPr/>
+        </p:nvSpPr>
+        <p:spPr>
+          <a:xfrm rot="10800000" flipV="1">
+            <a:off x="988251" y="836712"/>
+            <a:ext cx="3024336" cy="576064"/>
+          </a:xfrm>
+          <a:prstGeom prst="rect">
+            <a:avLst/>
+          </a:prstGeom>
+          <a:noFill/>
+        </p:spPr>
+        <p:style>
+          <a:lnRef idx="2">
+            <a:schemeClr val="accent1">
+              <a:shade val="50000"/>
+            </a:schemeClr>
+          </a:lnRef>
+          <a:fillRef idx="1">
+            <a:schemeClr val="accent1"/>
+          </a:fillRef>
+          <a:effectRef idx="0">
+            <a:schemeClr val="accent1"/>
+          </a:effectRef>
+          <a:fontRef idx="minor">
+            <a:schemeClr val="lt1"/>
+          </a:fontRef>
+        </p:style>
+        <p:txBody>
+          <a:bodyPr lIns="0" tIns="0" rIns="0" bIns="0" rtlCol="0" anchor="ctr"/>
+          <a:lstStyle/>
+          <a:p>
+            <a:pPr algn="ctr"/>
+            <a:r>
+              <a:rPr lang="en-US" altLang="ko-KR" sz="1000" dirty="0" err="1" smtClean="0">
+                <a:solidFill>
+                  <a:schemeClr val="tx1"/>
+                </a:solidFill>
+              </a:rPr>
+              <a:t>i</a:t>
+            </a:r>
+            <a:r>
+              <a:rPr lang="en-US" altLang="ko-KR" sz="1000" dirty="0" smtClean="0">
+                <a:solidFill>
+                  <a:schemeClr val="tx1"/>
+                </a:solidFill>
+              </a:rPr>
+              <a:t> =0 , </a:t>
+            </a:r>
+            <a:r>
+              <a:rPr lang="en-US" altLang="ko-KR" sz="1000" dirty="0" err="1" smtClean="0">
+                <a:solidFill>
+                  <a:schemeClr val="tx1"/>
+                </a:solidFill>
+              </a:rPr>
+              <a:t>i</a:t>
+            </a:r>
+            <a:r>
+              <a:rPr lang="en-US" altLang="ko-KR" sz="1000" dirty="0" smtClean="0">
+                <a:solidFill>
+                  <a:schemeClr val="tx1"/>
+                </a:solidFill>
+              </a:rPr>
+              <a:t> &lt;Length(</a:t>
+            </a:r>
+            <a:r>
+              <a:rPr lang="en-US" altLang="ko-KR" sz="1000" dirty="0" err="1" smtClean="0">
+                <a:solidFill>
+                  <a:schemeClr val="tx1"/>
+                </a:solidFill>
+              </a:rPr>
+              <a:t>CircleArray</a:t>
+            </a:r>
+            <a:r>
+              <a:rPr lang="en-US" altLang="ko-KR" sz="1000" dirty="0" smtClean="0">
+                <a:solidFill>
+                  <a:schemeClr val="tx1"/>
+                </a:solidFill>
+              </a:rPr>
+              <a:t>) , 1</a:t>
+            </a:r>
+            <a:endParaRPr lang="ko-KR" altLang="en-US" sz="1000" dirty="0">
+              <a:solidFill>
+                <a:schemeClr val="tx1"/>
+              </a:solidFill>
+            </a:endParaRPr>
+          </a:p>
+        </p:txBody>
+      </p:sp>
+      <p:sp>
+        <p:nvSpPr>
+          <p:cNvPr id="97" name="순서도: 판단 96"/>
+          <p:cNvSpPr/>
+          <p:nvPr/>
+        </p:nvSpPr>
+        <p:spPr>
+          <a:xfrm>
+            <a:off x="1585999" y="1531491"/>
+            <a:ext cx="1832234" cy="427926"/>
+          </a:xfrm>
+          <a:prstGeom prst="flowChartDecision">
+            <a:avLst/>
+          </a:prstGeom>
+          <a:noFill/>
+        </p:spPr>
+        <p:style>
+          <a:lnRef idx="2">
+            <a:schemeClr val="accent1">
+              <a:shade val="50000"/>
+            </a:schemeClr>
+          </a:lnRef>
+          <a:fillRef idx="1">
+            <a:schemeClr val="accent1"/>
+          </a:fillRef>
+          <a:effectRef idx="0">
+            <a:schemeClr val="accent1"/>
+          </a:effectRef>
+          <a:fontRef idx="minor">
+            <a:schemeClr val="lt1"/>
+          </a:fontRef>
+        </p:style>
+        <p:txBody>
+          <a:bodyPr lIns="0" tIns="9578" rIns="0" bIns="9578" rtlCol="0" anchor="ctr"/>
+          <a:lstStyle/>
+          <a:p>
+            <a:pPr algn="ctr"/>
+            <a:r>
+              <a:rPr lang="en-US" altLang="ko-KR" sz="1000" dirty="0" err="1" smtClean="0">
+                <a:solidFill>
+                  <a:schemeClr val="tx1"/>
+                </a:solidFill>
+              </a:rPr>
+              <a:t>CircleArray</a:t>
+            </a:r>
+            <a:r>
+              <a:rPr lang="en-US" altLang="ko-KR" sz="1000" dirty="0" smtClean="0">
+                <a:solidFill>
+                  <a:schemeClr val="tx1"/>
+                </a:solidFill>
+              </a:rPr>
+              <a:t> [</a:t>
+            </a:r>
+            <a:r>
+              <a:rPr lang="en-US" altLang="ko-KR" sz="1000" dirty="0" err="1" smtClean="0">
+                <a:solidFill>
+                  <a:schemeClr val="tx1"/>
+                </a:solidFill>
+              </a:rPr>
+              <a:t>i</a:t>
+            </a:r>
+            <a:r>
+              <a:rPr lang="en-US" altLang="ko-KR" sz="1000" dirty="0" smtClean="0">
+                <a:solidFill>
+                  <a:schemeClr val="tx1"/>
+                </a:solidFill>
+              </a:rPr>
+              <a:t>] = null</a:t>
+            </a:r>
+            <a:endParaRPr lang="ko-KR" altLang="en-US" sz="1000" dirty="0">
+              <a:solidFill>
+                <a:schemeClr val="tx1"/>
+              </a:solidFill>
+            </a:endParaRPr>
+          </a:p>
+        </p:txBody>
+      </p:sp>
+      <p:sp>
+        <p:nvSpPr>
+          <p:cNvPr id="99" name="TextBox 98"/>
+          <p:cNvSpPr txBox="1"/>
+          <p:nvPr/>
+        </p:nvSpPr>
+        <p:spPr>
+          <a:xfrm>
+            <a:off x="3436521" y="1554731"/>
+            <a:ext cx="268474" cy="153888"/>
+          </a:xfrm>
+          <a:prstGeom prst="rect">
+            <a:avLst/>
+          </a:prstGeom>
+          <a:noFill/>
+        </p:spPr>
+        <p:txBody>
+          <a:bodyPr wrap="square" lIns="0" tIns="0" rIns="0" bIns="0" rtlCol="0">
+            <a:spAutoFit/>
+          </a:bodyPr>
+          <a:lstStyle/>
+          <a:p>
+            <a:r>
+              <a:rPr lang="en-US" altLang="ko-KR" sz="1000" dirty="0" smtClean="0"/>
+              <a:t>Yes</a:t>
+            </a:r>
+            <a:endParaRPr lang="ko-KR" altLang="en-US" sz="1000" dirty="0"/>
+          </a:p>
+        </p:txBody>
+      </p:sp>
+      <p:sp>
+        <p:nvSpPr>
+          <p:cNvPr id="105" name="직사각형 104"/>
+          <p:cNvSpPr/>
+          <p:nvPr/>
+        </p:nvSpPr>
+        <p:spPr>
+          <a:xfrm rot="10800000" flipV="1">
+            <a:off x="2906935" y="2042553"/>
+            <a:ext cx="1039738" cy="234318"/>
+          </a:xfrm>
+          <a:prstGeom prst="rect">
+            <a:avLst/>
+          </a:prstGeom>
+          <a:noFill/>
+        </p:spPr>
+        <p:style>
+          <a:lnRef idx="2">
+            <a:schemeClr val="accent1">
+              <a:shade val="50000"/>
+            </a:schemeClr>
+          </a:lnRef>
+          <a:fillRef idx="1">
+            <a:schemeClr val="accent1"/>
+          </a:fillRef>
+          <a:effectRef idx="0">
+            <a:schemeClr val="accent1"/>
+          </a:effectRef>
+          <a:fontRef idx="minor">
+            <a:schemeClr val="lt1"/>
+          </a:fontRef>
+        </p:style>
+        <p:txBody>
+          <a:bodyPr lIns="0" tIns="0" rIns="0" bIns="0" rtlCol="0" anchor="ctr"/>
+          <a:lstStyle/>
+          <a:p>
+            <a:pPr algn="ctr"/>
+            <a:r>
+              <a:rPr lang="en-US" altLang="ko-KR" sz="1000" dirty="0" smtClean="0">
+                <a:solidFill>
+                  <a:schemeClr val="tx1"/>
+                </a:solidFill>
+              </a:rPr>
+              <a:t>Break</a:t>
+            </a:r>
+            <a:endParaRPr lang="ko-KR" altLang="en-US" sz="1000" dirty="0">
+              <a:solidFill>
+                <a:schemeClr val="tx1"/>
+              </a:solidFill>
+            </a:endParaRPr>
+          </a:p>
+        </p:txBody>
+      </p:sp>
+      <p:cxnSp>
+        <p:nvCxnSpPr>
+          <p:cNvPr id="107" name="직선 화살표 연결선 106"/>
+          <p:cNvCxnSpPr>
+            <a:endCxn id="105" idx="0"/>
+          </p:cNvCxnSpPr>
+          <p:nvPr/>
+        </p:nvCxnSpPr>
+        <p:spPr>
+          <a:xfrm>
+            <a:off x="3418233" y="1698747"/>
+            <a:ext cx="8571" cy="343806"/>
+          </a:xfrm>
+          <a:prstGeom prst="straightConnector1">
+            <a:avLst/>
+          </a:prstGeom>
+          <a:ln>
+            <a:tailEnd type="arrow"/>
+          </a:ln>
+        </p:spPr>
+        <p:style>
+          <a:lnRef idx="1">
+            <a:schemeClr val="accent1"/>
+          </a:lnRef>
+          <a:fillRef idx="0">
+            <a:schemeClr val="accent1"/>
+          </a:fillRef>
+          <a:effectRef idx="0">
+            <a:schemeClr val="accent1"/>
+          </a:effectRef>
+          <a:fontRef idx="minor">
+            <a:schemeClr val="tx1"/>
+          </a:fontRef>
+        </p:style>
+      </p:cxnSp>
+      <p:cxnSp>
+        <p:nvCxnSpPr>
+          <p:cNvPr id="113" name="직선 화살표 연결선 112"/>
+          <p:cNvCxnSpPr>
+            <a:stCxn id="97" idx="2"/>
+            <a:endCxn id="94" idx="2"/>
+          </p:cNvCxnSpPr>
+          <p:nvPr/>
+        </p:nvCxnSpPr>
+        <p:spPr>
+          <a:xfrm flipH="1">
+            <a:off x="2500418" y="1959417"/>
+            <a:ext cx="1698" cy="389463"/>
+          </a:xfrm>
+          <a:prstGeom prst="straightConnector1">
+            <a:avLst/>
+          </a:prstGeom>
+          <a:ln>
+            <a:tailEnd type="arrow"/>
+          </a:ln>
+        </p:spPr>
+        <p:style>
+          <a:lnRef idx="1">
+            <a:schemeClr val="accent1"/>
+          </a:lnRef>
+          <a:fillRef idx="0">
+            <a:schemeClr val="accent1"/>
+          </a:fillRef>
+          <a:effectRef idx="0">
+            <a:schemeClr val="accent1"/>
+          </a:effectRef>
+          <a:fontRef idx="minor">
+            <a:schemeClr val="tx1"/>
+          </a:fontRef>
+        </p:style>
+      </p:cxnSp>
+      <p:sp>
+        <p:nvSpPr>
+          <p:cNvPr id="114" name="TextBox 113"/>
+          <p:cNvSpPr txBox="1"/>
+          <p:nvPr/>
+        </p:nvSpPr>
+        <p:spPr>
+          <a:xfrm>
+            <a:off x="2224577" y="1916832"/>
+            <a:ext cx="203451" cy="131173"/>
+          </a:xfrm>
+          <a:prstGeom prst="rect">
+            <a:avLst/>
+          </a:prstGeom>
+          <a:noFill/>
+        </p:spPr>
+        <p:txBody>
+          <a:bodyPr wrap="square" lIns="0" tIns="0" rIns="0" bIns="0" rtlCol="0">
+            <a:spAutoFit/>
+          </a:bodyPr>
+          <a:lstStyle/>
+          <a:p>
+            <a:r>
+              <a:rPr lang="en-US" altLang="ko-KR" sz="1000" dirty="0" smtClean="0"/>
+              <a:t>No</a:t>
+            </a:r>
+            <a:endParaRPr lang="ko-KR" altLang="en-US" sz="1000" dirty="0"/>
+          </a:p>
+        </p:txBody>
+      </p:sp>
+      <p:sp>
+        <p:nvSpPr>
+          <p:cNvPr id="116" name="순서도: 판단 115"/>
+          <p:cNvSpPr/>
+          <p:nvPr/>
+        </p:nvSpPr>
+        <p:spPr>
+          <a:xfrm>
+            <a:off x="1161152" y="2654096"/>
+            <a:ext cx="2714318" cy="427926"/>
+          </a:xfrm>
+          <a:prstGeom prst="flowChartDecision">
+            <a:avLst/>
+          </a:prstGeom>
+          <a:noFill/>
+        </p:spPr>
+        <p:style>
+          <a:lnRef idx="2">
+            <a:schemeClr val="accent1">
+              <a:shade val="50000"/>
+            </a:schemeClr>
+          </a:lnRef>
+          <a:fillRef idx="1">
+            <a:schemeClr val="accent1"/>
+          </a:fillRef>
+          <a:effectRef idx="0">
+            <a:schemeClr val="accent1"/>
+          </a:effectRef>
+          <a:fontRef idx="minor">
+            <a:schemeClr val="lt1"/>
+          </a:fontRef>
+        </p:style>
+        <p:txBody>
+          <a:bodyPr lIns="0" tIns="9578" rIns="0" bIns="9578" rtlCol="0" anchor="ctr"/>
+          <a:lstStyle/>
+          <a:p>
+            <a:pPr algn="ctr"/>
+            <a:r>
+              <a:rPr lang="en-US" altLang="ko-KR" sz="1000" dirty="0" err="1" smtClean="0">
+                <a:solidFill>
+                  <a:schemeClr val="tx1"/>
+                </a:solidFill>
+              </a:rPr>
+              <a:t>i</a:t>
+            </a:r>
+            <a:r>
+              <a:rPr lang="en-US" altLang="ko-KR" sz="1000" dirty="0" smtClean="0">
+                <a:solidFill>
+                  <a:schemeClr val="tx1"/>
+                </a:solidFill>
+              </a:rPr>
+              <a:t> &lt; Length(</a:t>
+            </a:r>
+            <a:r>
+              <a:rPr lang="en-US" altLang="ko-KR" sz="1000" dirty="0" err="1" smtClean="0">
+                <a:solidFill>
+                  <a:schemeClr val="tx1"/>
+                </a:solidFill>
+              </a:rPr>
+              <a:t>CircleArray</a:t>
+            </a:r>
+            <a:endParaRPr lang="ko-KR" altLang="en-US" sz="1000" dirty="0">
+              <a:solidFill>
+                <a:schemeClr val="tx1"/>
+              </a:solidFill>
+            </a:endParaRPr>
+          </a:p>
+        </p:txBody>
+      </p:sp>
+      <p:cxnSp>
+        <p:nvCxnSpPr>
+          <p:cNvPr id="118" name="직선 화살표 연결선 117"/>
+          <p:cNvCxnSpPr>
+            <a:stCxn id="94" idx="2"/>
+            <a:endCxn id="116" idx="0"/>
+          </p:cNvCxnSpPr>
+          <p:nvPr/>
+        </p:nvCxnSpPr>
+        <p:spPr>
+          <a:xfrm>
+            <a:off x="2500418" y="2348880"/>
+            <a:ext cx="17893" cy="305216"/>
+          </a:xfrm>
+          <a:prstGeom prst="straightConnector1">
+            <a:avLst/>
+          </a:prstGeom>
+          <a:ln>
+            <a:tailEnd type="arrow"/>
+          </a:ln>
+        </p:spPr>
+        <p:style>
+          <a:lnRef idx="1">
+            <a:schemeClr val="accent1"/>
+          </a:lnRef>
+          <a:fillRef idx="0">
+            <a:schemeClr val="accent1"/>
+          </a:fillRef>
+          <a:effectRef idx="0">
+            <a:schemeClr val="accent1"/>
+          </a:effectRef>
+          <a:fontRef idx="minor">
+            <a:schemeClr val="tx1"/>
+          </a:fontRef>
+        </p:style>
+      </p:cxnSp>
+      <p:cxnSp>
+        <p:nvCxnSpPr>
+          <p:cNvPr id="121" name="직선 화살표 연결선 120"/>
+          <p:cNvCxnSpPr>
+            <a:stCxn id="96" idx="2"/>
+            <a:endCxn id="97" idx="0"/>
+          </p:cNvCxnSpPr>
+          <p:nvPr/>
+        </p:nvCxnSpPr>
+        <p:spPr>
+          <a:xfrm>
+            <a:off x="2500419" y="1412776"/>
+            <a:ext cx="1697" cy="118715"/>
+          </a:xfrm>
+          <a:prstGeom prst="straightConnector1">
+            <a:avLst/>
+          </a:prstGeom>
+          <a:ln>
+            <a:tailEnd type="arrow"/>
+          </a:ln>
+        </p:spPr>
+        <p:style>
+          <a:lnRef idx="1">
+            <a:schemeClr val="accent1"/>
+          </a:lnRef>
+          <a:fillRef idx="0">
+            <a:schemeClr val="accent1"/>
+          </a:fillRef>
+          <a:effectRef idx="0">
+            <a:schemeClr val="accent1"/>
+          </a:effectRef>
+          <a:fontRef idx="minor">
+            <a:schemeClr val="tx1"/>
+          </a:fontRef>
+        </p:style>
+      </p:cxnSp>
+      <p:sp>
+        <p:nvSpPr>
+          <p:cNvPr id="128" name="TextBox 127"/>
+          <p:cNvSpPr txBox="1"/>
+          <p:nvPr/>
+        </p:nvSpPr>
+        <p:spPr>
+          <a:xfrm>
+            <a:off x="915371" y="2721982"/>
+            <a:ext cx="203451" cy="131173"/>
+          </a:xfrm>
+          <a:prstGeom prst="rect">
+            <a:avLst/>
+          </a:prstGeom>
+          <a:noFill/>
+        </p:spPr>
+        <p:txBody>
+          <a:bodyPr wrap="square" lIns="0" tIns="0" rIns="0" bIns="0" rtlCol="0">
+            <a:spAutoFit/>
+          </a:bodyPr>
+          <a:lstStyle/>
+          <a:p>
+            <a:r>
+              <a:rPr lang="en-US" altLang="ko-KR" sz="1000" dirty="0" smtClean="0"/>
+              <a:t>No</a:t>
+            </a:r>
+            <a:endParaRPr lang="ko-KR" altLang="en-US" sz="1000" dirty="0"/>
+          </a:p>
+        </p:txBody>
+      </p:sp>
+      <p:sp>
+        <p:nvSpPr>
+          <p:cNvPr id="129" name="TextBox 128"/>
+          <p:cNvSpPr txBox="1"/>
+          <p:nvPr/>
+        </p:nvSpPr>
+        <p:spPr>
+          <a:xfrm>
+            <a:off x="3795691" y="2712110"/>
+            <a:ext cx="268474" cy="153888"/>
+          </a:xfrm>
+          <a:prstGeom prst="rect">
+            <a:avLst/>
+          </a:prstGeom>
+          <a:noFill/>
+        </p:spPr>
+        <p:txBody>
+          <a:bodyPr wrap="square" lIns="0" tIns="0" rIns="0" bIns="0" rtlCol="0">
+            <a:spAutoFit/>
+          </a:bodyPr>
+          <a:lstStyle/>
+          <a:p>
+            <a:r>
+              <a:rPr lang="en-US" altLang="ko-KR" sz="1000" dirty="0" smtClean="0"/>
+              <a:t>Yes</a:t>
+            </a:r>
+            <a:endParaRPr lang="ko-KR" altLang="en-US" sz="1000" dirty="0"/>
+          </a:p>
+        </p:txBody>
+      </p:sp>
+      <p:sp>
+        <p:nvSpPr>
+          <p:cNvPr id="130" name="직사각형 129"/>
+          <p:cNvSpPr/>
+          <p:nvPr/>
+        </p:nvSpPr>
+        <p:spPr>
+          <a:xfrm rot="10800000" flipV="1">
+            <a:off x="3083382" y="3226038"/>
+            <a:ext cx="1584176" cy="216024"/>
+          </a:xfrm>
+          <a:prstGeom prst="rect">
+            <a:avLst/>
+          </a:prstGeom>
+          <a:noFill/>
+        </p:spPr>
+        <p:style>
+          <a:lnRef idx="2">
+            <a:schemeClr val="accent1">
+              <a:shade val="50000"/>
+            </a:schemeClr>
+          </a:lnRef>
+          <a:fillRef idx="1">
+            <a:schemeClr val="accent1"/>
+          </a:fillRef>
+          <a:effectRef idx="0">
+            <a:schemeClr val="accent1"/>
+          </a:effectRef>
+          <a:fontRef idx="minor">
+            <a:schemeClr val="lt1"/>
+          </a:fontRef>
+        </p:style>
+        <p:txBody>
+          <a:bodyPr lIns="0" tIns="0" rIns="0" bIns="0" rtlCol="0" anchor="ctr"/>
+          <a:lstStyle/>
+          <a:p>
+            <a:pPr algn="ctr"/>
+            <a:r>
+              <a:rPr lang="en-US" altLang="ko-KR" sz="1000" dirty="0" err="1" smtClean="0">
+                <a:solidFill>
+                  <a:schemeClr val="tx1"/>
+                </a:solidFill>
+              </a:rPr>
+              <a:t>aIndex</a:t>
+            </a:r>
+            <a:r>
+              <a:rPr lang="en-US" altLang="ko-KR" sz="1000" dirty="0" smtClean="0">
+                <a:solidFill>
+                  <a:schemeClr val="tx1"/>
+                </a:solidFill>
+              </a:rPr>
+              <a:t> = </a:t>
+            </a:r>
+            <a:r>
+              <a:rPr lang="en-US" altLang="ko-KR" sz="1000" dirty="0" err="1" smtClean="0">
+                <a:solidFill>
+                  <a:schemeClr val="tx1"/>
+                </a:solidFill>
+              </a:rPr>
+              <a:t>i</a:t>
+            </a:r>
+            <a:endParaRPr lang="ko-KR" altLang="en-US" sz="1000" dirty="0" smtClean="0">
+              <a:solidFill>
+                <a:schemeClr val="tx1"/>
+              </a:solidFill>
+            </a:endParaRPr>
+          </a:p>
+        </p:txBody>
+      </p:sp>
+      <p:cxnSp>
+        <p:nvCxnSpPr>
+          <p:cNvPr id="136" name="직선 화살표 연결선 135"/>
+          <p:cNvCxnSpPr>
+            <a:stCxn id="116" idx="3"/>
+            <a:endCxn id="130" idx="0"/>
+          </p:cNvCxnSpPr>
+          <p:nvPr/>
+        </p:nvCxnSpPr>
+        <p:spPr>
+          <a:xfrm>
+            <a:off x="3875470" y="2868059"/>
+            <a:ext cx="0" cy="357979"/>
+          </a:xfrm>
+          <a:prstGeom prst="straightConnector1">
+            <a:avLst/>
+          </a:prstGeom>
+          <a:ln>
+            <a:tailEnd type="arrow"/>
+          </a:ln>
+        </p:spPr>
+        <p:style>
+          <a:lnRef idx="1">
+            <a:schemeClr val="accent1"/>
+          </a:lnRef>
+          <a:fillRef idx="0">
+            <a:schemeClr val="accent1"/>
+          </a:fillRef>
+          <a:effectRef idx="0">
+            <a:schemeClr val="accent1"/>
+          </a:effectRef>
+          <a:fontRef idx="minor">
+            <a:schemeClr val="tx1"/>
+          </a:fontRef>
+        </p:style>
+      </p:cxnSp>
+      <p:sp>
+        <p:nvSpPr>
+          <p:cNvPr id="143" name="직사각형 142"/>
+          <p:cNvSpPr/>
+          <p:nvPr/>
+        </p:nvSpPr>
+        <p:spPr>
+          <a:xfrm rot="10800000" flipV="1">
+            <a:off x="810750" y="4581127"/>
+            <a:ext cx="3568776" cy="216024"/>
+          </a:xfrm>
+          <a:prstGeom prst="rect">
+            <a:avLst/>
+          </a:prstGeom>
+          <a:noFill/>
+        </p:spPr>
+        <p:style>
+          <a:lnRef idx="2">
+            <a:schemeClr val="accent1">
+              <a:shade val="50000"/>
+            </a:schemeClr>
+          </a:lnRef>
+          <a:fillRef idx="1">
+            <a:schemeClr val="accent1"/>
+          </a:fillRef>
+          <a:effectRef idx="0">
+            <a:schemeClr val="accent1"/>
+          </a:effectRef>
+          <a:fontRef idx="minor">
+            <a:schemeClr val="lt1"/>
+          </a:fontRef>
+        </p:style>
+        <p:txBody>
+          <a:bodyPr lIns="0" tIns="0" rIns="0" bIns="0" rtlCol="0" anchor="ctr"/>
+          <a:lstStyle/>
+          <a:p>
+            <a:pPr algn="ctr"/>
+            <a:r>
+              <a:rPr lang="en-US" altLang="ko-KR" sz="1000" dirty="0" err="1" smtClean="0">
+                <a:solidFill>
+                  <a:schemeClr val="tx1"/>
+                </a:solidFill>
+              </a:rPr>
+              <a:t>CircleArray</a:t>
+            </a:r>
+            <a:r>
+              <a:rPr lang="en-US" altLang="ko-KR" sz="1000" dirty="0" smtClean="0">
+                <a:solidFill>
+                  <a:schemeClr val="tx1"/>
+                </a:solidFill>
+              </a:rPr>
+              <a:t>[</a:t>
+            </a:r>
+            <a:r>
+              <a:rPr lang="en-US" altLang="ko-KR" sz="1000" dirty="0" err="1" smtClean="0">
+                <a:solidFill>
+                  <a:schemeClr val="tx1"/>
+                </a:solidFill>
+              </a:rPr>
+              <a:t>aIndex</a:t>
+            </a:r>
+            <a:r>
+              <a:rPr lang="en-US" altLang="ko-KR" sz="1000" dirty="0" smtClean="0">
+                <a:solidFill>
+                  <a:schemeClr val="tx1"/>
+                </a:solidFill>
+              </a:rPr>
+              <a:t>] = </a:t>
+            </a:r>
+            <a:r>
+              <a:rPr lang="en-US" altLang="ko-KR" sz="1000" dirty="0" err="1" smtClean="0">
+                <a:solidFill>
+                  <a:schemeClr val="tx1"/>
+                </a:solidFill>
+              </a:rPr>
+              <a:t>aRecord</a:t>
+            </a:r>
+            <a:endParaRPr lang="ko-KR" altLang="en-US" sz="1000" dirty="0" smtClean="0">
+              <a:solidFill>
+                <a:schemeClr val="tx1"/>
+              </a:solidFill>
+            </a:endParaRPr>
+          </a:p>
+        </p:txBody>
+      </p:sp>
+      <p:cxnSp>
+        <p:nvCxnSpPr>
+          <p:cNvPr id="145" name="직선 화살표 연결선 144"/>
+          <p:cNvCxnSpPr>
+            <a:stCxn id="116" idx="1"/>
+          </p:cNvCxnSpPr>
+          <p:nvPr/>
+        </p:nvCxnSpPr>
+        <p:spPr>
+          <a:xfrm>
+            <a:off x="1161152" y="2868059"/>
+            <a:ext cx="10669" cy="285971"/>
+          </a:xfrm>
+          <a:prstGeom prst="straightConnector1">
+            <a:avLst/>
+          </a:prstGeom>
+          <a:ln>
+            <a:tailEnd type="arrow"/>
+          </a:ln>
+        </p:spPr>
+        <p:style>
+          <a:lnRef idx="1">
+            <a:schemeClr val="accent1"/>
+          </a:lnRef>
+          <a:fillRef idx="0">
+            <a:schemeClr val="accent1"/>
+          </a:fillRef>
+          <a:effectRef idx="0">
+            <a:schemeClr val="accent1"/>
+          </a:effectRef>
+          <a:fontRef idx="minor">
+            <a:schemeClr val="tx1"/>
+          </a:fontRef>
+        </p:style>
+      </p:cxnSp>
+      <p:cxnSp>
+        <p:nvCxnSpPr>
+          <p:cNvPr id="148" name="꺾인 연결선 147"/>
+          <p:cNvCxnSpPr>
+            <a:stCxn id="32" idx="2"/>
+          </p:cNvCxnSpPr>
+          <p:nvPr/>
+        </p:nvCxnSpPr>
+        <p:spPr>
+          <a:xfrm rot="16200000" flipH="1">
+            <a:off x="2044411" y="3251373"/>
+            <a:ext cx="144015" cy="957440"/>
+          </a:xfrm>
+          <a:prstGeom prst="bentConnector3">
+            <a:avLst>
+              <a:gd name="adj1" fmla="val 50000"/>
+            </a:avLst>
+          </a:prstGeom>
+          <a:ln>
+            <a:tailEnd type="arrow"/>
+          </a:ln>
+        </p:spPr>
+        <p:style>
+          <a:lnRef idx="1">
+            <a:schemeClr val="accent1"/>
+          </a:lnRef>
+          <a:fillRef idx="0">
+            <a:schemeClr val="accent1"/>
+          </a:fillRef>
+          <a:effectRef idx="0">
+            <a:schemeClr val="accent1"/>
+          </a:effectRef>
+          <a:fontRef idx="minor">
+            <a:schemeClr val="tx1"/>
+          </a:fontRef>
+        </p:style>
+      </p:cxnSp>
+      <p:cxnSp>
+        <p:nvCxnSpPr>
+          <p:cNvPr id="150" name="꺾인 연결선 149"/>
+          <p:cNvCxnSpPr>
+            <a:stCxn id="130" idx="2"/>
+          </p:cNvCxnSpPr>
+          <p:nvPr/>
+        </p:nvCxnSpPr>
+        <p:spPr>
+          <a:xfrm rot="5400000">
+            <a:off x="3055285" y="2981915"/>
+            <a:ext cx="360039" cy="1280332"/>
+          </a:xfrm>
+          <a:prstGeom prst="bentConnector3">
+            <a:avLst>
+              <a:gd name="adj1" fmla="val 77212"/>
+            </a:avLst>
+          </a:prstGeom>
+          <a:ln>
+            <a:tailEnd type="arrow"/>
+          </a:ln>
+        </p:spPr>
+        <p:style>
+          <a:lnRef idx="1">
+            <a:schemeClr val="accent1"/>
+          </a:lnRef>
+          <a:fillRef idx="0">
+            <a:schemeClr val="accent1"/>
+          </a:fillRef>
+          <a:effectRef idx="0">
+            <a:schemeClr val="accent1"/>
+          </a:effectRef>
+          <a:fontRef idx="minor">
+            <a:schemeClr val="tx1"/>
+          </a:fontRef>
+        </p:style>
+      </p:cxnSp>
+      <p:cxnSp>
+        <p:nvCxnSpPr>
+          <p:cNvPr id="155" name="직선 화살표 연결선 154"/>
+          <p:cNvCxnSpPr>
+            <a:stCxn id="70" idx="2"/>
+            <a:endCxn id="29" idx="0"/>
+          </p:cNvCxnSpPr>
+          <p:nvPr/>
+        </p:nvCxnSpPr>
+        <p:spPr>
+          <a:xfrm flipH="1">
+            <a:off x="2583555" y="5535252"/>
+            <a:ext cx="11583" cy="125996"/>
+          </a:xfrm>
+          <a:prstGeom prst="straightConnector1">
+            <a:avLst/>
+          </a:prstGeom>
+          <a:ln>
+            <a:tailEnd type="arrow"/>
+          </a:ln>
+        </p:spPr>
+        <p:style>
+          <a:lnRef idx="1">
+            <a:schemeClr val="accent1"/>
+          </a:lnRef>
+          <a:fillRef idx="0">
+            <a:schemeClr val="accent1"/>
+          </a:fillRef>
+          <a:effectRef idx="0">
+            <a:schemeClr val="accent1"/>
+          </a:effectRef>
+          <a:fontRef idx="minor">
+            <a:schemeClr val="tx1"/>
+          </a:fontRef>
+        </p:style>
+      </p:cxnSp>
+      <p:sp>
+        <p:nvSpPr>
+          <p:cNvPr id="180" name="순서도: 판단 179"/>
+          <p:cNvSpPr/>
+          <p:nvPr/>
+        </p:nvSpPr>
+        <p:spPr>
+          <a:xfrm>
+            <a:off x="10873308" y="3501008"/>
+            <a:ext cx="2316532" cy="203002"/>
+          </a:xfrm>
+          <a:prstGeom prst="flowChartDecision">
+            <a:avLst/>
+          </a:prstGeom>
+          <a:noFill/>
+        </p:spPr>
+        <p:style>
+          <a:lnRef idx="2">
+            <a:schemeClr val="accent1">
+              <a:shade val="50000"/>
+            </a:schemeClr>
+          </a:lnRef>
+          <a:fillRef idx="1">
+            <a:schemeClr val="accent1"/>
+          </a:fillRef>
+          <a:effectRef idx="0">
+            <a:schemeClr val="accent1"/>
+          </a:effectRef>
+          <a:fontRef idx="minor">
+            <a:schemeClr val="lt1"/>
+          </a:fontRef>
+        </p:style>
+        <p:txBody>
+          <a:bodyPr lIns="0" tIns="9578" rIns="0" bIns="9578" rtlCol="0" anchor="ctr"/>
+          <a:lstStyle/>
+          <a:p>
+            <a:pPr algn="ctr"/>
+            <a:r>
+              <a:rPr lang="en-US" altLang="ko-KR" sz="1000" dirty="0" smtClean="0">
+                <a:solidFill>
+                  <a:schemeClr val="tx1"/>
+                </a:solidFill>
+              </a:rPr>
+              <a:t>Value in Array</a:t>
+            </a:r>
+            <a:endParaRPr lang="ko-KR" altLang="en-US" sz="1000" dirty="0">
+              <a:solidFill>
+                <a:schemeClr val="tx1"/>
+              </a:solidFill>
+            </a:endParaRPr>
+          </a:p>
+        </p:txBody>
+      </p:sp>
+      <p:sp>
+        <p:nvSpPr>
+          <p:cNvPr id="212" name="직사각형 211"/>
+          <p:cNvSpPr/>
+          <p:nvPr/>
+        </p:nvSpPr>
+        <p:spPr>
+          <a:xfrm rot="10800000" flipV="1">
+            <a:off x="11521380" y="3933056"/>
+            <a:ext cx="1080120" cy="360040"/>
+          </a:xfrm>
+          <a:prstGeom prst="rect">
+            <a:avLst/>
+          </a:prstGeom>
+          <a:noFill/>
+        </p:spPr>
+        <p:style>
+          <a:lnRef idx="2">
+            <a:schemeClr val="accent1">
+              <a:shade val="50000"/>
+            </a:schemeClr>
+          </a:lnRef>
+          <a:fillRef idx="1">
+            <a:schemeClr val="accent1"/>
+          </a:fillRef>
+          <a:effectRef idx="0">
+            <a:schemeClr val="accent1"/>
+          </a:effectRef>
+          <a:fontRef idx="minor">
+            <a:schemeClr val="lt1"/>
+          </a:fontRef>
+        </p:style>
+        <p:txBody>
+          <a:bodyPr lIns="0" tIns="0" rIns="0" bIns="0" rtlCol="0" anchor="ctr"/>
+          <a:lstStyle/>
+          <a:p>
+            <a:pPr algn="ctr"/>
+            <a:r>
+              <a:rPr lang="en-US" altLang="ko-KR" sz="1000" dirty="0" err="1" smtClean="0">
+                <a:solidFill>
+                  <a:schemeClr val="tx1"/>
+                </a:solidFill>
+              </a:rPr>
+              <a:t>SetLength</a:t>
+            </a:r>
+            <a:endParaRPr lang="en-US" altLang="ko-KR" sz="1000" dirty="0" smtClean="0">
+              <a:solidFill>
+                <a:schemeClr val="tx1"/>
+              </a:solidFill>
+            </a:endParaRPr>
+          </a:p>
+          <a:p>
+            <a:pPr algn="ctr"/>
+            <a:r>
+              <a:rPr lang="en-US" altLang="ko-KR" sz="1000" dirty="0" smtClean="0">
+                <a:solidFill>
+                  <a:schemeClr val="tx1"/>
+                </a:solidFill>
+              </a:rPr>
+              <a:t>(CircleArray,0)</a:t>
+            </a:r>
+          </a:p>
+        </p:txBody>
+      </p:sp>
+      <p:cxnSp>
+        <p:nvCxnSpPr>
+          <p:cNvPr id="247" name="직선 화살표 연결선 246"/>
+          <p:cNvCxnSpPr>
+            <a:stCxn id="14" idx="2"/>
+            <a:endCxn id="96" idx="0"/>
+          </p:cNvCxnSpPr>
+          <p:nvPr/>
+        </p:nvCxnSpPr>
+        <p:spPr>
+          <a:xfrm flipH="1">
+            <a:off x="2500419" y="781135"/>
+            <a:ext cx="5744" cy="55577"/>
+          </a:xfrm>
+          <a:prstGeom prst="straightConnector1">
+            <a:avLst/>
+          </a:prstGeom>
+          <a:ln>
+            <a:tailEnd type="arrow"/>
+          </a:ln>
+        </p:spPr>
+        <p:style>
+          <a:lnRef idx="1">
+            <a:schemeClr val="accent1"/>
+          </a:lnRef>
+          <a:fillRef idx="0">
+            <a:schemeClr val="accent1"/>
+          </a:fillRef>
+          <a:effectRef idx="0">
+            <a:schemeClr val="accent1"/>
+          </a:effectRef>
+          <a:fontRef idx="minor">
+            <a:schemeClr val="tx1"/>
+          </a:fontRef>
+        </p:style>
+      </p:cxnSp>
+      <p:sp>
+        <p:nvSpPr>
+          <p:cNvPr id="259" name="직사각형 258"/>
+          <p:cNvSpPr/>
+          <p:nvPr/>
+        </p:nvSpPr>
+        <p:spPr>
+          <a:xfrm rot="10800000" flipV="1">
+            <a:off x="810750" y="4901815"/>
+            <a:ext cx="3568776" cy="216024"/>
+          </a:xfrm>
+          <a:prstGeom prst="rect">
+            <a:avLst/>
+          </a:prstGeom>
+          <a:noFill/>
+        </p:spPr>
+        <p:style>
+          <a:lnRef idx="2">
+            <a:schemeClr val="accent1">
+              <a:shade val="50000"/>
+            </a:schemeClr>
+          </a:lnRef>
+          <a:fillRef idx="1">
+            <a:schemeClr val="accent1"/>
+          </a:fillRef>
+          <a:effectRef idx="0">
+            <a:schemeClr val="accent1"/>
+          </a:effectRef>
+          <a:fontRef idx="minor">
+            <a:schemeClr val="lt1"/>
+          </a:fontRef>
+        </p:style>
+        <p:txBody>
+          <a:bodyPr lIns="0" tIns="0" rIns="0" bIns="0" rtlCol="0" anchor="ctr"/>
+          <a:lstStyle/>
+          <a:p>
+            <a:pPr algn="ctr"/>
+            <a:r>
+              <a:rPr lang="en-US" altLang="ko-KR" sz="1000" dirty="0" err="1" smtClean="0">
+                <a:solidFill>
+                  <a:schemeClr val="tx1"/>
+                </a:solidFill>
+              </a:rPr>
+              <a:t>DrawCircle</a:t>
+            </a:r>
+            <a:r>
+              <a:rPr lang="en-US" altLang="ko-KR" sz="1000" dirty="0" smtClean="0">
+                <a:solidFill>
+                  <a:schemeClr val="tx1"/>
+                </a:solidFill>
+              </a:rPr>
+              <a:t>(</a:t>
+            </a:r>
+            <a:r>
+              <a:rPr lang="en-US" altLang="ko-KR" sz="1000" dirty="0" err="1" smtClean="0">
+                <a:solidFill>
+                  <a:schemeClr val="tx1"/>
+                </a:solidFill>
+              </a:rPr>
+              <a:t>aIndex</a:t>
+            </a:r>
+            <a:r>
+              <a:rPr lang="en-US" altLang="ko-KR" sz="1000" dirty="0" smtClean="0">
+                <a:solidFill>
+                  <a:schemeClr val="tx1"/>
+                </a:solidFill>
+              </a:rPr>
+              <a:t>)</a:t>
+            </a:r>
+            <a:endParaRPr lang="ko-KR" altLang="en-US" sz="1000" dirty="0" smtClean="0">
+              <a:solidFill>
+                <a:schemeClr val="tx1"/>
+              </a:solidFill>
+            </a:endParaRPr>
+          </a:p>
+        </p:txBody>
+      </p:sp>
+      <p:cxnSp>
+        <p:nvCxnSpPr>
+          <p:cNvPr id="263" name="직선 화살표 연결선 262"/>
+          <p:cNvCxnSpPr>
+            <a:stCxn id="143" idx="2"/>
+            <a:endCxn id="259" idx="0"/>
+          </p:cNvCxnSpPr>
+          <p:nvPr/>
+        </p:nvCxnSpPr>
+        <p:spPr>
+          <a:xfrm>
+            <a:off x="2595138" y="4797151"/>
+            <a:ext cx="0" cy="104664"/>
+          </a:xfrm>
+          <a:prstGeom prst="straightConnector1">
+            <a:avLst/>
+          </a:prstGeom>
+          <a:ln>
+            <a:tailEnd type="arrow"/>
+          </a:ln>
+        </p:spPr>
+        <p:style>
+          <a:lnRef idx="1">
+            <a:schemeClr val="accent1"/>
+          </a:lnRef>
+          <a:fillRef idx="0">
+            <a:schemeClr val="accent1"/>
+          </a:fillRef>
+          <a:effectRef idx="0">
+            <a:schemeClr val="accent1"/>
+          </a:effectRef>
+          <a:fontRef idx="minor">
+            <a:schemeClr val="tx1"/>
+          </a:fontRef>
+        </p:style>
+      </p:cxnSp>
+      <p:cxnSp>
+        <p:nvCxnSpPr>
+          <p:cNvPr id="265" name="직선 화살표 연결선 264"/>
+          <p:cNvCxnSpPr>
+            <a:stCxn id="259" idx="2"/>
+            <a:endCxn id="70" idx="0"/>
+          </p:cNvCxnSpPr>
+          <p:nvPr/>
+        </p:nvCxnSpPr>
+        <p:spPr>
+          <a:xfrm>
+            <a:off x="2595138" y="5117839"/>
+            <a:ext cx="0" cy="111361"/>
+          </a:xfrm>
+          <a:prstGeom prst="straightConnector1">
+            <a:avLst/>
+          </a:prstGeom>
+          <a:ln>
+            <a:tailEnd type="arrow"/>
+          </a:ln>
+        </p:spPr>
+        <p:style>
+          <a:lnRef idx="1">
+            <a:schemeClr val="accent1"/>
+          </a:lnRef>
+          <a:fillRef idx="0">
+            <a:schemeClr val="accent1"/>
+          </a:fillRef>
+          <a:effectRef idx="0">
+            <a:schemeClr val="accent1"/>
+          </a:effectRef>
+          <a:fontRef idx="minor">
+            <a:schemeClr val="tx1"/>
+          </a:fontRef>
+        </p:style>
+      </p:cxnSp>
+      <p:sp>
+        <p:nvSpPr>
+          <p:cNvPr id="298" name="직사각형 297"/>
+          <p:cNvSpPr/>
+          <p:nvPr/>
+        </p:nvSpPr>
+        <p:spPr>
+          <a:xfrm rot="10800000" flipV="1">
+            <a:off x="5558976" y="1988841"/>
+            <a:ext cx="4234212" cy="288032"/>
+          </a:xfrm>
+          <a:prstGeom prst="rect">
+            <a:avLst/>
+          </a:prstGeom>
+          <a:noFill/>
+        </p:spPr>
+        <p:style>
+          <a:lnRef idx="2">
+            <a:schemeClr val="accent1">
+              <a:shade val="50000"/>
+            </a:schemeClr>
+          </a:lnRef>
+          <a:fillRef idx="1">
+            <a:schemeClr val="accent1"/>
+          </a:fillRef>
+          <a:effectRef idx="0">
+            <a:schemeClr val="accent1"/>
+          </a:effectRef>
+          <a:fontRef idx="minor">
+            <a:schemeClr val="lt1"/>
+          </a:fontRef>
+        </p:style>
+        <p:txBody>
+          <a:bodyPr lIns="0" tIns="0" rIns="0" bIns="0" rtlCol="0" anchor="ctr"/>
+          <a:lstStyle/>
+          <a:p>
+            <a:pPr algn="ctr"/>
+            <a:r>
+              <a:rPr lang="en-US" altLang="ko-KR" sz="1000" dirty="0" err="1" smtClean="0">
+                <a:solidFill>
+                  <a:schemeClr val="tx1"/>
+                </a:solidFill>
+              </a:rPr>
+              <a:t>aXorColor</a:t>
+            </a:r>
+            <a:r>
+              <a:rPr lang="en-US" altLang="ko-KR" sz="1000" dirty="0" smtClean="0">
+                <a:solidFill>
+                  <a:schemeClr val="tx1"/>
+                </a:solidFill>
+              </a:rPr>
+              <a:t> = </a:t>
+            </a:r>
+            <a:r>
+              <a:rPr lang="ko-KR" altLang="en-US" sz="1000" dirty="0" smtClean="0">
+                <a:solidFill>
+                  <a:schemeClr val="tx1"/>
+                </a:solidFill>
+              </a:rPr>
+              <a:t>배경색상 </a:t>
+            </a:r>
+            <a:r>
+              <a:rPr lang="en-US" altLang="ko-KR" sz="1000" dirty="0" smtClean="0">
+                <a:solidFill>
+                  <a:schemeClr val="tx1"/>
+                </a:solidFill>
+              </a:rPr>
+              <a:t>XOR</a:t>
+            </a:r>
+            <a:r>
+              <a:rPr lang="ko-KR" altLang="en-US" sz="1000" dirty="0" smtClean="0">
+                <a:solidFill>
+                  <a:schemeClr val="tx1"/>
+                </a:solidFill>
+              </a:rPr>
+              <a:t>해서 </a:t>
+            </a:r>
+            <a:r>
+              <a:rPr lang="en-US" altLang="ko-KR" sz="1000" dirty="0" err="1" smtClean="0">
+                <a:solidFill>
+                  <a:schemeClr val="tx1"/>
+                </a:solidFill>
+              </a:rPr>
+              <a:t>CircleArray</a:t>
+            </a:r>
+            <a:r>
+              <a:rPr lang="en-US" altLang="ko-KR" sz="1000" dirty="0" smtClean="0">
+                <a:solidFill>
+                  <a:schemeClr val="tx1"/>
+                </a:solidFill>
+              </a:rPr>
+              <a:t>[</a:t>
+            </a:r>
+            <a:r>
+              <a:rPr lang="en-US" altLang="ko-KR" sz="1000" dirty="0" err="1" smtClean="0">
+                <a:solidFill>
+                  <a:schemeClr val="tx1"/>
+                </a:solidFill>
+              </a:rPr>
+              <a:t>aIndex</a:t>
+            </a:r>
+            <a:r>
+              <a:rPr lang="en-US" altLang="ko-KR" sz="1000" dirty="0" smtClean="0">
+                <a:solidFill>
+                  <a:schemeClr val="tx1"/>
+                </a:solidFill>
+              </a:rPr>
+              <a:t>].Color </a:t>
+            </a:r>
+            <a:r>
+              <a:rPr lang="ko-KR" altLang="en-US" sz="1000" dirty="0" smtClean="0">
+                <a:solidFill>
+                  <a:schemeClr val="tx1"/>
+                </a:solidFill>
+              </a:rPr>
+              <a:t>가 되는 색</a:t>
+            </a:r>
+            <a:endParaRPr lang="ko-KR" altLang="en-US" sz="1000" dirty="0">
+              <a:solidFill>
+                <a:schemeClr val="tx1"/>
+              </a:solidFill>
+            </a:endParaRPr>
+          </a:p>
+        </p:txBody>
+      </p:sp>
+      <p:sp>
+        <p:nvSpPr>
+          <p:cNvPr id="301" name="직사각형 300"/>
+          <p:cNvSpPr/>
+          <p:nvPr/>
+        </p:nvSpPr>
+        <p:spPr>
+          <a:xfrm rot="10800000" flipV="1">
+            <a:off x="5898225" y="2420889"/>
+            <a:ext cx="3568776" cy="216023"/>
+          </a:xfrm>
+          <a:prstGeom prst="rect">
+            <a:avLst/>
+          </a:prstGeom>
+          <a:noFill/>
+        </p:spPr>
+        <p:style>
+          <a:lnRef idx="2">
+            <a:schemeClr val="accent1">
+              <a:shade val="50000"/>
+            </a:schemeClr>
+          </a:lnRef>
+          <a:fillRef idx="1">
+            <a:schemeClr val="accent1"/>
+          </a:fillRef>
+          <a:effectRef idx="0">
+            <a:schemeClr val="accent1"/>
+          </a:effectRef>
+          <a:fontRef idx="minor">
+            <a:schemeClr val="lt1"/>
+          </a:fontRef>
+        </p:style>
+        <p:txBody>
+          <a:bodyPr lIns="0" tIns="0" rIns="0" bIns="0" rtlCol="0" anchor="ctr"/>
+          <a:lstStyle/>
+          <a:p>
+            <a:pPr algn="ctr"/>
+            <a:r>
+              <a:rPr lang="en-US" altLang="ko-KR" sz="1000" dirty="0" err="1" smtClean="0">
+                <a:solidFill>
+                  <a:schemeClr val="tx1"/>
+                </a:solidFill>
+              </a:rPr>
+              <a:t>Pen.Color</a:t>
+            </a:r>
+            <a:r>
+              <a:rPr lang="en-US" altLang="ko-KR" sz="1000" dirty="0" smtClean="0">
+                <a:solidFill>
+                  <a:schemeClr val="tx1"/>
+                </a:solidFill>
+              </a:rPr>
+              <a:t> = </a:t>
+            </a:r>
+            <a:r>
+              <a:rPr lang="en-US" altLang="ko-KR" sz="1000" dirty="0" err="1" smtClean="0">
+                <a:solidFill>
+                  <a:schemeClr val="tx1"/>
+                </a:solidFill>
+              </a:rPr>
+              <a:t>aXorColor</a:t>
+            </a:r>
+            <a:endParaRPr lang="ko-KR" altLang="en-US" sz="1000" dirty="0">
+              <a:solidFill>
+                <a:schemeClr val="tx1"/>
+              </a:solidFill>
+            </a:endParaRPr>
+          </a:p>
+        </p:txBody>
+      </p:sp>
+      <p:sp>
+        <p:nvSpPr>
+          <p:cNvPr id="303" name="TextBox 302"/>
+          <p:cNvSpPr txBox="1"/>
+          <p:nvPr/>
+        </p:nvSpPr>
+        <p:spPr>
+          <a:xfrm>
+            <a:off x="5544716" y="683404"/>
+            <a:ext cx="1313180" cy="369332"/>
+          </a:xfrm>
+          <a:prstGeom prst="rect">
+            <a:avLst/>
+          </a:prstGeom>
+          <a:noFill/>
+        </p:spPr>
+        <p:txBody>
+          <a:bodyPr wrap="none" rtlCol="0">
+            <a:spAutoFit/>
+          </a:bodyPr>
+          <a:lstStyle/>
+          <a:p>
+            <a:r>
+              <a:rPr lang="en-US" altLang="ko-KR" sz="900" dirty="0" err="1" smtClean="0"/>
+              <a:t>aXorColor</a:t>
+            </a:r>
+            <a:r>
+              <a:rPr lang="en-US" altLang="ko-KR" sz="900" dirty="0" smtClean="0"/>
+              <a:t> : Integer</a:t>
+            </a:r>
+          </a:p>
+          <a:p>
+            <a:r>
+              <a:rPr lang="en-US" altLang="ko-KR" sz="900" dirty="0" err="1" smtClean="0"/>
+              <a:t>aX</a:t>
+            </a:r>
+            <a:r>
+              <a:rPr lang="en-US" altLang="ko-KR" sz="900" dirty="0" smtClean="0"/>
+              <a:t>, </a:t>
+            </a:r>
+            <a:r>
+              <a:rPr lang="en-US" altLang="ko-KR" sz="900" dirty="0" err="1" smtClean="0"/>
+              <a:t>aY</a:t>
+            </a:r>
+            <a:r>
+              <a:rPr lang="en-US" altLang="ko-KR" sz="900" dirty="0" smtClean="0"/>
+              <a:t>, </a:t>
+            </a:r>
+            <a:r>
+              <a:rPr lang="en-US" altLang="ko-KR" sz="900" dirty="0" err="1" smtClean="0"/>
+              <a:t>aSize</a:t>
+            </a:r>
+            <a:r>
+              <a:rPr lang="en-US" altLang="ko-KR" sz="900" dirty="0" smtClean="0"/>
+              <a:t> : Integer</a:t>
+            </a:r>
+            <a:endParaRPr lang="ko-KR" altLang="en-US" sz="900" dirty="0"/>
+          </a:p>
+        </p:txBody>
+      </p:sp>
+      <p:cxnSp>
+        <p:nvCxnSpPr>
+          <p:cNvPr id="305" name="직선 화살표 연결선 304"/>
+          <p:cNvCxnSpPr>
+            <a:stCxn id="158" idx="2"/>
+            <a:endCxn id="298" idx="0"/>
+          </p:cNvCxnSpPr>
+          <p:nvPr/>
+        </p:nvCxnSpPr>
+        <p:spPr>
+          <a:xfrm>
+            <a:off x="7669382" y="1700808"/>
+            <a:ext cx="6700" cy="288033"/>
+          </a:xfrm>
+          <a:prstGeom prst="straightConnector1">
+            <a:avLst/>
+          </a:prstGeom>
+          <a:ln>
+            <a:tailEnd type="arrow"/>
+          </a:ln>
+        </p:spPr>
+        <p:style>
+          <a:lnRef idx="1">
+            <a:schemeClr val="accent1"/>
+          </a:lnRef>
+          <a:fillRef idx="0">
+            <a:schemeClr val="accent1"/>
+          </a:fillRef>
+          <a:effectRef idx="0">
+            <a:schemeClr val="accent1"/>
+          </a:effectRef>
+          <a:fontRef idx="minor">
+            <a:schemeClr val="tx1"/>
+          </a:fontRef>
+        </p:style>
+      </p:cxnSp>
+      <p:cxnSp>
+        <p:nvCxnSpPr>
+          <p:cNvPr id="307" name="직선 화살표 연결선 306"/>
+          <p:cNvCxnSpPr>
+            <a:stCxn id="298" idx="2"/>
+            <a:endCxn id="301" idx="0"/>
+          </p:cNvCxnSpPr>
+          <p:nvPr/>
+        </p:nvCxnSpPr>
+        <p:spPr>
+          <a:xfrm>
+            <a:off x="7676082" y="2276873"/>
+            <a:ext cx="6531" cy="144016"/>
+          </a:xfrm>
+          <a:prstGeom prst="straightConnector1">
+            <a:avLst/>
+          </a:prstGeom>
+          <a:ln>
+            <a:tailEnd type="arrow"/>
+          </a:ln>
+        </p:spPr>
+        <p:style>
+          <a:lnRef idx="1">
+            <a:schemeClr val="accent1"/>
+          </a:lnRef>
+          <a:fillRef idx="0">
+            <a:schemeClr val="accent1"/>
+          </a:fillRef>
+          <a:effectRef idx="0">
+            <a:schemeClr val="accent1"/>
+          </a:effectRef>
+          <a:fontRef idx="minor">
+            <a:schemeClr val="tx1"/>
+          </a:fontRef>
+        </p:style>
+      </p:cxnSp>
+      <p:sp>
+        <p:nvSpPr>
+          <p:cNvPr id="313" name="직사각형 312"/>
+          <p:cNvSpPr/>
+          <p:nvPr/>
+        </p:nvSpPr>
+        <p:spPr>
+          <a:xfrm rot="10800000" flipV="1">
+            <a:off x="5644046" y="2852936"/>
+            <a:ext cx="4077134" cy="236428"/>
+          </a:xfrm>
+          <a:prstGeom prst="rect">
+            <a:avLst/>
+          </a:prstGeom>
+          <a:noFill/>
+        </p:spPr>
+        <p:style>
+          <a:lnRef idx="2">
+            <a:schemeClr val="accent1">
+              <a:shade val="50000"/>
+            </a:schemeClr>
+          </a:lnRef>
+          <a:fillRef idx="1">
+            <a:schemeClr val="accent1"/>
+          </a:fillRef>
+          <a:effectRef idx="0">
+            <a:schemeClr val="accent1"/>
+          </a:effectRef>
+          <a:fontRef idx="minor">
+            <a:schemeClr val="lt1"/>
+          </a:fontRef>
+        </p:style>
+        <p:txBody>
+          <a:bodyPr lIns="0" tIns="0" rIns="0" bIns="0" rtlCol="0" anchor="ctr"/>
+          <a:lstStyle/>
+          <a:p>
+            <a:pPr algn="ctr"/>
+            <a:r>
+              <a:rPr lang="en-US" altLang="ko-KR" sz="1000" dirty="0" smtClean="0">
+                <a:solidFill>
+                  <a:schemeClr val="tx1"/>
+                </a:solidFill>
+              </a:rPr>
+              <a:t>XOR</a:t>
+            </a:r>
+            <a:r>
+              <a:rPr lang="ko-KR" altLang="en-US" sz="1000" dirty="0" smtClean="0">
+                <a:solidFill>
+                  <a:schemeClr val="tx1"/>
+                </a:solidFill>
+              </a:rPr>
+              <a:t>모드로 그리기</a:t>
+            </a:r>
+            <a:r>
+              <a:rPr lang="en-US" altLang="ko-KR" sz="1000" dirty="0" smtClean="0">
+                <a:solidFill>
+                  <a:schemeClr val="tx1"/>
+                </a:solidFill>
+              </a:rPr>
+              <a:t>(Ellipse(</a:t>
+            </a:r>
+            <a:r>
+              <a:rPr lang="en-US" altLang="ko-KR" sz="1000" dirty="0" err="1" smtClean="0">
+                <a:solidFill>
+                  <a:schemeClr val="tx1"/>
+                </a:solidFill>
+              </a:rPr>
+              <a:t>aX-aSize</a:t>
+            </a:r>
+            <a:r>
+              <a:rPr lang="en-US" altLang="ko-KR" sz="1000" dirty="0" smtClean="0">
+                <a:solidFill>
+                  <a:schemeClr val="tx1"/>
+                </a:solidFill>
+              </a:rPr>
+              <a:t>, </a:t>
+            </a:r>
+            <a:r>
+              <a:rPr lang="en-US" altLang="ko-KR" sz="1000" dirty="0" err="1" smtClean="0">
+                <a:solidFill>
+                  <a:schemeClr val="tx1"/>
+                </a:solidFill>
+              </a:rPr>
+              <a:t>aY-aSize</a:t>
+            </a:r>
+            <a:r>
+              <a:rPr lang="en-US" altLang="ko-KR" sz="1000" dirty="0" smtClean="0">
+                <a:solidFill>
+                  <a:schemeClr val="tx1"/>
+                </a:solidFill>
+              </a:rPr>
+              <a:t>, </a:t>
+            </a:r>
+            <a:r>
+              <a:rPr lang="en-US" altLang="ko-KR" sz="1000" dirty="0" err="1" smtClean="0">
+                <a:solidFill>
+                  <a:schemeClr val="tx1"/>
+                </a:solidFill>
+              </a:rPr>
+              <a:t>aX+aSize</a:t>
+            </a:r>
+            <a:r>
+              <a:rPr lang="en-US" altLang="ko-KR" sz="1000" dirty="0" smtClean="0">
+                <a:solidFill>
+                  <a:schemeClr val="tx1"/>
+                </a:solidFill>
+              </a:rPr>
+              <a:t>, </a:t>
+            </a:r>
+            <a:r>
+              <a:rPr lang="en-US" altLang="ko-KR" sz="1000" dirty="0" err="1" smtClean="0">
+                <a:solidFill>
+                  <a:schemeClr val="tx1"/>
+                </a:solidFill>
+              </a:rPr>
+              <a:t>aY+aSize</a:t>
+            </a:r>
+            <a:r>
+              <a:rPr lang="en-US" altLang="ko-KR" sz="1000" dirty="0" smtClean="0">
+                <a:solidFill>
+                  <a:schemeClr val="tx1"/>
+                </a:solidFill>
+              </a:rPr>
+              <a:t>))</a:t>
+            </a:r>
+            <a:endParaRPr lang="ko-KR" altLang="en-US" sz="1000" dirty="0">
+              <a:solidFill>
+                <a:schemeClr val="tx1"/>
+              </a:solidFill>
+            </a:endParaRPr>
+          </a:p>
+        </p:txBody>
+      </p:sp>
+      <p:sp>
+        <p:nvSpPr>
+          <p:cNvPr id="314" name="직사각형 313"/>
+          <p:cNvSpPr/>
+          <p:nvPr/>
+        </p:nvSpPr>
+        <p:spPr>
+          <a:xfrm rot="10800000" flipV="1">
+            <a:off x="10755416" y="2492897"/>
+            <a:ext cx="2560897" cy="306895"/>
+          </a:xfrm>
+          <a:prstGeom prst="rect">
+            <a:avLst/>
+          </a:prstGeom>
+          <a:noFill/>
+        </p:spPr>
+        <p:style>
+          <a:lnRef idx="2">
+            <a:schemeClr val="accent1">
+              <a:shade val="50000"/>
+            </a:schemeClr>
+          </a:lnRef>
+          <a:fillRef idx="1">
+            <a:schemeClr val="accent1"/>
+          </a:fillRef>
+          <a:effectRef idx="0">
+            <a:schemeClr val="accent1"/>
+          </a:effectRef>
+          <a:fontRef idx="minor">
+            <a:schemeClr val="lt1"/>
+          </a:fontRef>
+        </p:style>
+        <p:txBody>
+          <a:bodyPr lIns="0" tIns="0" rIns="0" bIns="0" rtlCol="0" anchor="ctr"/>
+          <a:lstStyle/>
+          <a:p>
+            <a:pPr algn="ctr"/>
+            <a:r>
+              <a:rPr lang="en-US" altLang="ko-KR" sz="1000" dirty="0" err="1" smtClean="0">
+                <a:solidFill>
+                  <a:schemeClr val="tx1"/>
+                </a:solidFill>
+              </a:rPr>
+              <a:t>DrowCircle</a:t>
+            </a:r>
+            <a:r>
+              <a:rPr lang="en-US" altLang="ko-KR" sz="1000" dirty="0" smtClean="0">
+                <a:solidFill>
+                  <a:schemeClr val="tx1"/>
+                </a:solidFill>
+              </a:rPr>
+              <a:t>(</a:t>
+            </a:r>
+            <a:r>
+              <a:rPr lang="en-US" altLang="ko-KR" sz="1000" dirty="0" err="1" smtClean="0">
+                <a:solidFill>
+                  <a:schemeClr val="tx1"/>
+                </a:solidFill>
+              </a:rPr>
+              <a:t>aIndex</a:t>
+            </a:r>
+            <a:r>
+              <a:rPr lang="en-US" altLang="ko-KR" sz="1000" dirty="0" smtClean="0">
+                <a:solidFill>
+                  <a:schemeClr val="tx1"/>
+                </a:solidFill>
+              </a:rPr>
+              <a:t>)</a:t>
+            </a:r>
+            <a:endParaRPr lang="ko-KR" altLang="en-US" sz="1000" dirty="0" smtClean="0">
+              <a:solidFill>
+                <a:schemeClr val="tx1"/>
+              </a:solidFill>
+            </a:endParaRPr>
+          </a:p>
+        </p:txBody>
+      </p:sp>
+      <p:cxnSp>
+        <p:nvCxnSpPr>
+          <p:cNvPr id="317" name="직선 화살표 연결선 316"/>
+          <p:cNvCxnSpPr>
+            <a:stCxn id="301" idx="2"/>
+            <a:endCxn id="313" idx="0"/>
+          </p:cNvCxnSpPr>
+          <p:nvPr/>
+        </p:nvCxnSpPr>
+        <p:spPr>
+          <a:xfrm>
+            <a:off x="7682613" y="2636912"/>
+            <a:ext cx="0" cy="216024"/>
+          </a:xfrm>
+          <a:prstGeom prst="straightConnector1">
+            <a:avLst/>
+          </a:prstGeom>
+          <a:ln>
+            <a:tailEnd type="arrow"/>
+          </a:ln>
+        </p:spPr>
+        <p:style>
+          <a:lnRef idx="1">
+            <a:schemeClr val="accent1"/>
+          </a:lnRef>
+          <a:fillRef idx="0">
+            <a:schemeClr val="accent1"/>
+          </a:fillRef>
+          <a:effectRef idx="0">
+            <a:schemeClr val="accent1"/>
+          </a:effectRef>
+          <a:fontRef idx="minor">
+            <a:schemeClr val="tx1"/>
+          </a:fontRef>
+        </p:style>
+      </p:cxnSp>
+      <p:cxnSp>
+        <p:nvCxnSpPr>
+          <p:cNvPr id="322" name="직선 화살표 연결선 321"/>
+          <p:cNvCxnSpPr>
+            <a:stCxn id="21" idx="2"/>
+            <a:endCxn id="314" idx="0"/>
+          </p:cNvCxnSpPr>
+          <p:nvPr/>
+        </p:nvCxnSpPr>
+        <p:spPr>
+          <a:xfrm>
+            <a:off x="12023498" y="2348880"/>
+            <a:ext cx="12366" cy="144017"/>
+          </a:xfrm>
+          <a:prstGeom prst="straightConnector1">
+            <a:avLst/>
+          </a:prstGeom>
+          <a:ln>
+            <a:tailEnd type="arrow"/>
+          </a:ln>
+        </p:spPr>
+        <p:style>
+          <a:lnRef idx="1">
+            <a:schemeClr val="accent1"/>
+          </a:lnRef>
+          <a:fillRef idx="0">
+            <a:schemeClr val="accent1"/>
+          </a:fillRef>
+          <a:effectRef idx="0">
+            <a:schemeClr val="accent1"/>
+          </a:effectRef>
+          <a:fontRef idx="minor">
+            <a:schemeClr val="tx1"/>
+          </a:fontRef>
+        </p:style>
+      </p:cxnSp>
+      <p:cxnSp>
+        <p:nvCxnSpPr>
+          <p:cNvPr id="324" name="직선 화살표 연결선 323"/>
+          <p:cNvCxnSpPr>
+            <a:stCxn id="314" idx="2"/>
+            <a:endCxn id="15" idx="0"/>
+          </p:cNvCxnSpPr>
+          <p:nvPr/>
+        </p:nvCxnSpPr>
+        <p:spPr>
+          <a:xfrm>
+            <a:off x="12035864" y="2799792"/>
+            <a:ext cx="6531" cy="178297"/>
+          </a:xfrm>
+          <a:prstGeom prst="straightConnector1">
+            <a:avLst/>
+          </a:prstGeom>
+          <a:ln>
+            <a:tailEnd type="arrow"/>
+          </a:ln>
+        </p:spPr>
+        <p:style>
+          <a:lnRef idx="1">
+            <a:schemeClr val="accent1"/>
+          </a:lnRef>
+          <a:fillRef idx="0">
+            <a:schemeClr val="accent1"/>
+          </a:fillRef>
+          <a:effectRef idx="0">
+            <a:schemeClr val="accent1"/>
+          </a:effectRef>
+          <a:fontRef idx="minor">
+            <a:schemeClr val="tx1"/>
+          </a:fontRef>
+        </p:style>
+      </p:cxnSp>
+      <p:cxnSp>
+        <p:nvCxnSpPr>
+          <p:cNvPr id="326" name="직선 화살표 연결선 325"/>
+          <p:cNvCxnSpPr>
+            <a:stCxn id="15" idx="2"/>
+            <a:endCxn id="180" idx="0"/>
+          </p:cNvCxnSpPr>
+          <p:nvPr/>
+        </p:nvCxnSpPr>
+        <p:spPr>
+          <a:xfrm flipH="1">
+            <a:off x="12031574" y="3284984"/>
+            <a:ext cx="10821" cy="216024"/>
+          </a:xfrm>
+          <a:prstGeom prst="straightConnector1">
+            <a:avLst/>
+          </a:prstGeom>
+          <a:ln>
+            <a:tailEnd type="arrow"/>
+          </a:ln>
+        </p:spPr>
+        <p:style>
+          <a:lnRef idx="1">
+            <a:schemeClr val="accent1"/>
+          </a:lnRef>
+          <a:fillRef idx="0">
+            <a:schemeClr val="accent1"/>
+          </a:fillRef>
+          <a:effectRef idx="0">
+            <a:schemeClr val="accent1"/>
+          </a:effectRef>
+          <a:fontRef idx="minor">
+            <a:schemeClr val="tx1"/>
+          </a:fontRef>
+        </p:style>
+      </p:cxnSp>
+      <p:cxnSp>
+        <p:nvCxnSpPr>
+          <p:cNvPr id="126" name="직선 화살표 연결선 125"/>
+          <p:cNvCxnSpPr>
+            <a:stCxn id="180" idx="2"/>
+            <a:endCxn id="212" idx="0"/>
+          </p:cNvCxnSpPr>
+          <p:nvPr/>
+        </p:nvCxnSpPr>
+        <p:spPr>
+          <a:xfrm>
+            <a:off x="12031574" y="3704010"/>
+            <a:ext cx="29866" cy="229046"/>
+          </a:xfrm>
+          <a:prstGeom prst="straightConnector1">
+            <a:avLst/>
+          </a:prstGeom>
+          <a:ln>
+            <a:tailEnd type="arrow"/>
+          </a:ln>
+        </p:spPr>
+        <p:style>
+          <a:lnRef idx="1">
+            <a:schemeClr val="accent1"/>
+          </a:lnRef>
+          <a:fillRef idx="0">
+            <a:schemeClr val="accent1"/>
+          </a:fillRef>
+          <a:effectRef idx="0">
+            <a:schemeClr val="accent1"/>
+          </a:effectRef>
+          <a:fontRef idx="minor">
+            <a:schemeClr val="tx1"/>
+          </a:fontRef>
+        </p:style>
+      </p:cxnSp>
+      <p:cxnSp>
+        <p:nvCxnSpPr>
+          <p:cNvPr id="131" name="직선 화살표 연결선 130"/>
+          <p:cNvCxnSpPr>
+            <a:stCxn id="212" idx="2"/>
+            <a:endCxn id="20" idx="0"/>
+          </p:cNvCxnSpPr>
+          <p:nvPr/>
+        </p:nvCxnSpPr>
+        <p:spPr>
+          <a:xfrm>
+            <a:off x="12061440" y="4293096"/>
+            <a:ext cx="11238" cy="360040"/>
+          </a:xfrm>
+          <a:prstGeom prst="straightConnector1">
+            <a:avLst/>
+          </a:prstGeom>
+          <a:ln>
+            <a:tailEnd type="arrow"/>
+          </a:ln>
+        </p:spPr>
+        <p:style>
+          <a:lnRef idx="1">
+            <a:schemeClr val="accent1"/>
+          </a:lnRef>
+          <a:fillRef idx="0">
+            <a:schemeClr val="accent1"/>
+          </a:fillRef>
+          <a:effectRef idx="0">
+            <a:schemeClr val="accent1"/>
+          </a:effectRef>
+          <a:fontRef idx="minor">
+            <a:schemeClr val="tx1"/>
+          </a:fontRef>
+        </p:style>
+      </p:cxnSp>
+      <p:cxnSp>
+        <p:nvCxnSpPr>
+          <p:cNvPr id="133" name="꺾인 연결선 132"/>
+          <p:cNvCxnSpPr>
+            <a:stCxn id="180" idx="3"/>
+            <a:endCxn id="20" idx="3"/>
+          </p:cNvCxnSpPr>
+          <p:nvPr/>
+        </p:nvCxnSpPr>
+        <p:spPr>
+          <a:xfrm flipH="1">
+            <a:off x="13056023" y="3602509"/>
+            <a:ext cx="133817" cy="1173386"/>
+          </a:xfrm>
+          <a:prstGeom prst="bentConnector3">
+            <a:avLst>
+              <a:gd name="adj1" fmla="val -170830"/>
+            </a:avLst>
+          </a:prstGeom>
+          <a:ln>
+            <a:tailEnd type="arrow"/>
+          </a:ln>
+        </p:spPr>
+        <p:style>
+          <a:lnRef idx="1">
+            <a:schemeClr val="accent1"/>
+          </a:lnRef>
+          <a:fillRef idx="0">
+            <a:schemeClr val="accent1"/>
+          </a:fillRef>
+          <a:effectRef idx="0">
+            <a:schemeClr val="accent1"/>
+          </a:effectRef>
+          <a:fontRef idx="minor">
+            <a:schemeClr val="tx1"/>
+          </a:fontRef>
+        </p:style>
+      </p:cxnSp>
+      <p:sp>
+        <p:nvSpPr>
+          <p:cNvPr id="78" name="TextBox 77"/>
+          <p:cNvSpPr txBox="1"/>
+          <p:nvPr/>
+        </p:nvSpPr>
+        <p:spPr>
+          <a:xfrm>
+            <a:off x="12097444" y="3717032"/>
+            <a:ext cx="268474" cy="153888"/>
+          </a:xfrm>
+          <a:prstGeom prst="rect">
+            <a:avLst/>
+          </a:prstGeom>
+          <a:noFill/>
+        </p:spPr>
+        <p:txBody>
+          <a:bodyPr wrap="square" lIns="0" tIns="0" rIns="0" bIns="0" rtlCol="0">
+            <a:spAutoFit/>
+          </a:bodyPr>
+          <a:lstStyle/>
+          <a:p>
+            <a:r>
+              <a:rPr lang="en-US" altLang="ko-KR" sz="1000" dirty="0" smtClean="0"/>
+              <a:t>Yes</a:t>
+            </a:r>
+            <a:endParaRPr lang="ko-KR" altLang="en-US" sz="1000" dirty="0"/>
+          </a:p>
+        </p:txBody>
+      </p:sp>
+      <p:sp>
+        <p:nvSpPr>
+          <p:cNvPr id="79" name="TextBox 78"/>
+          <p:cNvSpPr txBox="1"/>
+          <p:nvPr/>
+        </p:nvSpPr>
+        <p:spPr>
+          <a:xfrm>
+            <a:off x="13177564" y="3429000"/>
+            <a:ext cx="203451" cy="131173"/>
+          </a:xfrm>
+          <a:prstGeom prst="rect">
+            <a:avLst/>
+          </a:prstGeom>
+          <a:noFill/>
+        </p:spPr>
+        <p:txBody>
+          <a:bodyPr wrap="square" lIns="0" tIns="0" rIns="0" bIns="0" rtlCol="0">
+            <a:spAutoFit/>
+          </a:bodyPr>
+          <a:lstStyle/>
+          <a:p>
+            <a:r>
+              <a:rPr lang="en-US" altLang="ko-KR" sz="1000" dirty="0" smtClean="0"/>
+              <a:t>No</a:t>
+            </a:r>
+            <a:endParaRPr lang="ko-KR" altLang="en-US" sz="1000" dirty="0"/>
+          </a:p>
+        </p:txBody>
+      </p:sp>
+      <p:cxnSp>
+        <p:nvCxnSpPr>
+          <p:cNvPr id="83" name="직선 화살표 연결선 82"/>
+          <p:cNvCxnSpPr>
+            <a:stCxn id="47" idx="2"/>
+            <a:endCxn id="143" idx="0"/>
+          </p:cNvCxnSpPr>
+          <p:nvPr/>
+        </p:nvCxnSpPr>
+        <p:spPr>
+          <a:xfrm flipH="1">
+            <a:off x="2595138" y="4450830"/>
+            <a:ext cx="488" cy="130297"/>
+          </a:xfrm>
+          <a:prstGeom prst="straightConnector1">
+            <a:avLst/>
+          </a:prstGeom>
+          <a:ln>
+            <a:tailEnd type="arrow"/>
+          </a:ln>
+        </p:spPr>
+        <p:style>
+          <a:lnRef idx="1">
+            <a:schemeClr val="accent1"/>
+          </a:lnRef>
+          <a:fillRef idx="0">
+            <a:schemeClr val="accent1"/>
+          </a:fillRef>
+          <a:effectRef idx="0">
+            <a:schemeClr val="accent1"/>
+          </a:effectRef>
+          <a:fontRef idx="minor">
+            <a:schemeClr val="tx1"/>
+          </a:fontRef>
+        </p:style>
+      </p:cxnSp>
     </p:spTree>
   </p:cSld>
   <p:clrMapOvr>

</xml_diff>